<commit_message>
documentation updates plus saving spectral details correction
</commit_message>
<xml_diff>
--- a/documentation/workflow_outline.pptx
+++ b/documentation/workflow_outline.pptx
@@ -138,7 +138,7 @@
           <p:cNvPr id="2" name="Title 1">
             <a:extLst>
               <a:ext uri="{FF2B5EF4-FFF2-40B4-BE49-F238E27FC236}">
-                <a16:creationId xmlns:a16="http://schemas.microsoft.com/office/drawing/2014/main" xmlns="" id="{C6C83856-3EBA-4CE0-A567-5CF12A513A50}"/>
+                <a16:creationId xmlns="" xmlns:a16="http://schemas.microsoft.com/office/drawing/2014/main" id="{C6C83856-3EBA-4CE0-A567-5CF12A513A50}"/>
               </a:ext>
             </a:extLst>
           </p:cNvPr>
@@ -176,7 +176,7 @@
           <p:cNvPr id="3" name="Subtitle 2">
             <a:extLst>
               <a:ext uri="{FF2B5EF4-FFF2-40B4-BE49-F238E27FC236}">
-                <a16:creationId xmlns:a16="http://schemas.microsoft.com/office/drawing/2014/main" xmlns="" id="{007F8CEB-1A6D-4D4A-8F35-D66D47ACD0EB}"/>
+                <a16:creationId xmlns="" xmlns:a16="http://schemas.microsoft.com/office/drawing/2014/main" id="{007F8CEB-1A6D-4D4A-8F35-D66D47ACD0EB}"/>
               </a:ext>
             </a:extLst>
           </p:cNvPr>
@@ -247,7 +247,7 @@
           <p:cNvPr id="4" name="Date Placeholder 3">
             <a:extLst>
               <a:ext uri="{FF2B5EF4-FFF2-40B4-BE49-F238E27FC236}">
-                <a16:creationId xmlns:a16="http://schemas.microsoft.com/office/drawing/2014/main" xmlns="" id="{DC7F17E8-AEFA-42B3-A39D-ECC1730E3D99}"/>
+                <a16:creationId xmlns="" xmlns:a16="http://schemas.microsoft.com/office/drawing/2014/main" id="{DC7F17E8-AEFA-42B3-A39D-ECC1730E3D99}"/>
               </a:ext>
             </a:extLst>
           </p:cNvPr>
@@ -265,7 +265,7 @@
           <a:p>
             <a:fld id="{89E9D7C5-078A-4914-8EA4-70BA0B43A824}" type="datetimeFigureOut">
               <a:rPr lang="en-GB" smtClean="0"/>
-              <a:t>16/01/2020</a:t>
+              <a:t>16/09/2020</a:t>
             </a:fld>
             <a:endParaRPr lang="en-GB"/>
           </a:p>
@@ -276,7 +276,7 @@
           <p:cNvPr id="5" name="Footer Placeholder 4">
             <a:extLst>
               <a:ext uri="{FF2B5EF4-FFF2-40B4-BE49-F238E27FC236}">
-                <a16:creationId xmlns:a16="http://schemas.microsoft.com/office/drawing/2014/main" xmlns="" id="{A45140EA-7ADF-42E4-8CDE-209C921899BF}"/>
+                <a16:creationId xmlns="" xmlns:a16="http://schemas.microsoft.com/office/drawing/2014/main" id="{A45140EA-7ADF-42E4-8CDE-209C921899BF}"/>
               </a:ext>
             </a:extLst>
           </p:cNvPr>
@@ -301,7 +301,7 @@
           <p:cNvPr id="6" name="Slide Number Placeholder 5">
             <a:extLst>
               <a:ext uri="{FF2B5EF4-FFF2-40B4-BE49-F238E27FC236}">
-                <a16:creationId xmlns:a16="http://schemas.microsoft.com/office/drawing/2014/main" xmlns="" id="{C79314B4-E34C-4EBE-9250-BC49FB767624}"/>
+                <a16:creationId xmlns="" xmlns:a16="http://schemas.microsoft.com/office/drawing/2014/main" id="{C79314B4-E34C-4EBE-9250-BC49FB767624}"/>
               </a:ext>
             </a:extLst>
           </p:cNvPr>
@@ -330,7 +330,7 @@
           <p:cNvPr id="7" name="hc">
             <a:extLst>
               <a:ext uri="{FF2B5EF4-FFF2-40B4-BE49-F238E27FC236}">
-                <a16:creationId xmlns:a16="http://schemas.microsoft.com/office/drawing/2014/main" xmlns="" id="{286F4A0F-6E89-42D1-A529-39388C21E5F7}"/>
+                <a16:creationId xmlns="" xmlns:a16="http://schemas.microsoft.com/office/drawing/2014/main" id="{286F4A0F-6E89-42D1-A529-39388C21E5F7}"/>
               </a:ext>
             </a:extLst>
           </p:cNvPr>
@@ -368,7 +368,7 @@
           <p:cNvPr id="8" name="fc">
             <a:extLst>
               <a:ext uri="{FF2B5EF4-FFF2-40B4-BE49-F238E27FC236}">
-                <a16:creationId xmlns:a16="http://schemas.microsoft.com/office/drawing/2014/main" xmlns="" id="{6D61054C-D9C7-4DE9-8B2D-CEB711AA4CDC}"/>
+                <a16:creationId xmlns="" xmlns:a16="http://schemas.microsoft.com/office/drawing/2014/main" id="{6D61054C-D9C7-4DE9-8B2D-CEB711AA4CDC}"/>
               </a:ext>
             </a:extLst>
           </p:cNvPr>
@@ -436,7 +436,7 @@
           <p:cNvPr id="2" name="Title 1">
             <a:extLst>
               <a:ext uri="{FF2B5EF4-FFF2-40B4-BE49-F238E27FC236}">
-                <a16:creationId xmlns:a16="http://schemas.microsoft.com/office/drawing/2014/main" xmlns="" id="{8B1DFDCF-322D-409D-AA31-DC27C13F3924}"/>
+                <a16:creationId xmlns="" xmlns:a16="http://schemas.microsoft.com/office/drawing/2014/main" id="{8B1DFDCF-322D-409D-AA31-DC27C13F3924}"/>
               </a:ext>
             </a:extLst>
           </p:cNvPr>
@@ -465,7 +465,7 @@
           <p:cNvPr id="3" name="Vertical Text Placeholder 2">
             <a:extLst>
               <a:ext uri="{FF2B5EF4-FFF2-40B4-BE49-F238E27FC236}">
-                <a16:creationId xmlns:a16="http://schemas.microsoft.com/office/drawing/2014/main" xmlns="" id="{8C48C702-26E5-4551-BD26-0068FEE815A5}"/>
+                <a16:creationId xmlns="" xmlns:a16="http://schemas.microsoft.com/office/drawing/2014/main" id="{8C48C702-26E5-4551-BD26-0068FEE815A5}"/>
               </a:ext>
             </a:extLst>
           </p:cNvPr>
@@ -523,7 +523,7 @@
           <p:cNvPr id="4" name="Date Placeholder 3">
             <a:extLst>
               <a:ext uri="{FF2B5EF4-FFF2-40B4-BE49-F238E27FC236}">
-                <a16:creationId xmlns:a16="http://schemas.microsoft.com/office/drawing/2014/main" xmlns="" id="{A011F058-AC7F-45C1-B98D-3ACD36F1FAB9}"/>
+                <a16:creationId xmlns="" xmlns:a16="http://schemas.microsoft.com/office/drawing/2014/main" id="{A011F058-AC7F-45C1-B98D-3ACD36F1FAB9}"/>
               </a:ext>
             </a:extLst>
           </p:cNvPr>
@@ -541,7 +541,7 @@
           <a:p>
             <a:fld id="{89E9D7C5-078A-4914-8EA4-70BA0B43A824}" type="datetimeFigureOut">
               <a:rPr lang="en-GB" smtClean="0"/>
-              <a:t>16/01/2020</a:t>
+              <a:t>16/09/2020</a:t>
             </a:fld>
             <a:endParaRPr lang="en-GB"/>
           </a:p>
@@ -552,7 +552,7 @@
           <p:cNvPr id="5" name="Footer Placeholder 4">
             <a:extLst>
               <a:ext uri="{FF2B5EF4-FFF2-40B4-BE49-F238E27FC236}">
-                <a16:creationId xmlns:a16="http://schemas.microsoft.com/office/drawing/2014/main" xmlns="" id="{83285343-16F3-45F9-9701-96E21E753BDD}"/>
+                <a16:creationId xmlns="" xmlns:a16="http://schemas.microsoft.com/office/drawing/2014/main" id="{83285343-16F3-45F9-9701-96E21E753BDD}"/>
               </a:ext>
             </a:extLst>
           </p:cNvPr>
@@ -577,7 +577,7 @@
           <p:cNvPr id="6" name="Slide Number Placeholder 5">
             <a:extLst>
               <a:ext uri="{FF2B5EF4-FFF2-40B4-BE49-F238E27FC236}">
-                <a16:creationId xmlns:a16="http://schemas.microsoft.com/office/drawing/2014/main" xmlns="" id="{A3DE9494-B494-47D4-B21A-B6B7FCB20042}"/>
+                <a16:creationId xmlns="" xmlns:a16="http://schemas.microsoft.com/office/drawing/2014/main" id="{A3DE9494-B494-47D4-B21A-B6B7FCB20042}"/>
               </a:ext>
             </a:extLst>
           </p:cNvPr>
@@ -636,7 +636,7 @@
           <p:cNvPr id="2" name="Vertical Title 1">
             <a:extLst>
               <a:ext uri="{FF2B5EF4-FFF2-40B4-BE49-F238E27FC236}">
-                <a16:creationId xmlns:a16="http://schemas.microsoft.com/office/drawing/2014/main" xmlns="" id="{32009CC3-5528-4AFF-9D52-2AAF537FABD6}"/>
+                <a16:creationId xmlns="" xmlns:a16="http://schemas.microsoft.com/office/drawing/2014/main" id="{32009CC3-5528-4AFF-9D52-2AAF537FABD6}"/>
               </a:ext>
             </a:extLst>
           </p:cNvPr>
@@ -670,7 +670,7 @@
           <p:cNvPr id="3" name="Vertical Text Placeholder 2">
             <a:extLst>
               <a:ext uri="{FF2B5EF4-FFF2-40B4-BE49-F238E27FC236}">
-                <a16:creationId xmlns:a16="http://schemas.microsoft.com/office/drawing/2014/main" xmlns="" id="{A3077D30-1D3E-4F57-81EA-E05A1B11A6B6}"/>
+                <a16:creationId xmlns="" xmlns:a16="http://schemas.microsoft.com/office/drawing/2014/main" id="{A3077D30-1D3E-4F57-81EA-E05A1B11A6B6}"/>
               </a:ext>
             </a:extLst>
           </p:cNvPr>
@@ -733,7 +733,7 @@
           <p:cNvPr id="4" name="Date Placeholder 3">
             <a:extLst>
               <a:ext uri="{FF2B5EF4-FFF2-40B4-BE49-F238E27FC236}">
-                <a16:creationId xmlns:a16="http://schemas.microsoft.com/office/drawing/2014/main" xmlns="" id="{2DDF74F8-3B43-41DA-A862-6313F46E4698}"/>
+                <a16:creationId xmlns="" xmlns:a16="http://schemas.microsoft.com/office/drawing/2014/main" id="{2DDF74F8-3B43-41DA-A862-6313F46E4698}"/>
               </a:ext>
             </a:extLst>
           </p:cNvPr>
@@ -751,7 +751,7 @@
           <a:p>
             <a:fld id="{89E9D7C5-078A-4914-8EA4-70BA0B43A824}" type="datetimeFigureOut">
               <a:rPr lang="en-GB" smtClean="0"/>
-              <a:t>16/01/2020</a:t>
+              <a:t>16/09/2020</a:t>
             </a:fld>
             <a:endParaRPr lang="en-GB"/>
           </a:p>
@@ -762,7 +762,7 @@
           <p:cNvPr id="5" name="Footer Placeholder 4">
             <a:extLst>
               <a:ext uri="{FF2B5EF4-FFF2-40B4-BE49-F238E27FC236}">
-                <a16:creationId xmlns:a16="http://schemas.microsoft.com/office/drawing/2014/main" xmlns="" id="{BC83B653-36B5-4698-912F-DE1D8EA0F00A}"/>
+                <a16:creationId xmlns="" xmlns:a16="http://schemas.microsoft.com/office/drawing/2014/main" id="{BC83B653-36B5-4698-912F-DE1D8EA0F00A}"/>
               </a:ext>
             </a:extLst>
           </p:cNvPr>
@@ -787,7 +787,7 @@
           <p:cNvPr id="6" name="Slide Number Placeholder 5">
             <a:extLst>
               <a:ext uri="{FF2B5EF4-FFF2-40B4-BE49-F238E27FC236}">
-                <a16:creationId xmlns:a16="http://schemas.microsoft.com/office/drawing/2014/main" xmlns="" id="{D753FD90-A584-4E58-95FB-D57D6CDB81FE}"/>
+                <a16:creationId xmlns="" xmlns:a16="http://schemas.microsoft.com/office/drawing/2014/main" id="{D753FD90-A584-4E58-95FB-D57D6CDB81FE}"/>
               </a:ext>
             </a:extLst>
           </p:cNvPr>
@@ -846,7 +846,7 @@
           <p:cNvPr id="2" name="Title 1">
             <a:extLst>
               <a:ext uri="{FF2B5EF4-FFF2-40B4-BE49-F238E27FC236}">
-                <a16:creationId xmlns:a16="http://schemas.microsoft.com/office/drawing/2014/main" xmlns="" id="{71B52F60-4E7D-49D9-9F55-827A59849FA3}"/>
+                <a16:creationId xmlns="" xmlns:a16="http://schemas.microsoft.com/office/drawing/2014/main" id="{71B52F60-4E7D-49D9-9F55-827A59849FA3}"/>
               </a:ext>
             </a:extLst>
           </p:cNvPr>
@@ -875,7 +875,7 @@
           <p:cNvPr id="3" name="Content Placeholder 2">
             <a:extLst>
               <a:ext uri="{FF2B5EF4-FFF2-40B4-BE49-F238E27FC236}">
-                <a16:creationId xmlns:a16="http://schemas.microsoft.com/office/drawing/2014/main" xmlns="" id="{32B9CDC8-ACB4-48DB-B70E-A930B1CDCB66}"/>
+                <a16:creationId xmlns="" xmlns:a16="http://schemas.microsoft.com/office/drawing/2014/main" id="{32B9CDC8-ACB4-48DB-B70E-A930B1CDCB66}"/>
               </a:ext>
             </a:extLst>
           </p:cNvPr>
@@ -933,7 +933,7 @@
           <p:cNvPr id="4" name="Date Placeholder 3">
             <a:extLst>
               <a:ext uri="{FF2B5EF4-FFF2-40B4-BE49-F238E27FC236}">
-                <a16:creationId xmlns:a16="http://schemas.microsoft.com/office/drawing/2014/main" xmlns="" id="{64EDF569-70F8-4C90-9057-69460E1CFA47}"/>
+                <a16:creationId xmlns="" xmlns:a16="http://schemas.microsoft.com/office/drawing/2014/main" id="{64EDF569-70F8-4C90-9057-69460E1CFA47}"/>
               </a:ext>
             </a:extLst>
           </p:cNvPr>
@@ -951,7 +951,7 @@
           <a:p>
             <a:fld id="{89E9D7C5-078A-4914-8EA4-70BA0B43A824}" type="datetimeFigureOut">
               <a:rPr lang="en-GB" smtClean="0"/>
-              <a:t>16/01/2020</a:t>
+              <a:t>16/09/2020</a:t>
             </a:fld>
             <a:endParaRPr lang="en-GB"/>
           </a:p>
@@ -962,7 +962,7 @@
           <p:cNvPr id="5" name="Footer Placeholder 4">
             <a:extLst>
               <a:ext uri="{FF2B5EF4-FFF2-40B4-BE49-F238E27FC236}">
-                <a16:creationId xmlns:a16="http://schemas.microsoft.com/office/drawing/2014/main" xmlns="" id="{6192D1E8-D545-48A9-94A0-31487F54A4BB}"/>
+                <a16:creationId xmlns="" xmlns:a16="http://schemas.microsoft.com/office/drawing/2014/main" id="{6192D1E8-D545-48A9-94A0-31487F54A4BB}"/>
               </a:ext>
             </a:extLst>
           </p:cNvPr>
@@ -987,7 +987,7 @@
           <p:cNvPr id="6" name="Slide Number Placeholder 5">
             <a:extLst>
               <a:ext uri="{FF2B5EF4-FFF2-40B4-BE49-F238E27FC236}">
-                <a16:creationId xmlns:a16="http://schemas.microsoft.com/office/drawing/2014/main" xmlns="" id="{B0DC0DDF-5721-49AE-9DAA-BDAD6EC4F45F}"/>
+                <a16:creationId xmlns="" xmlns:a16="http://schemas.microsoft.com/office/drawing/2014/main" id="{B0DC0DDF-5721-49AE-9DAA-BDAD6EC4F45F}"/>
               </a:ext>
             </a:extLst>
           </p:cNvPr>
@@ -1046,7 +1046,7 @@
           <p:cNvPr id="2" name="Title 1">
             <a:extLst>
               <a:ext uri="{FF2B5EF4-FFF2-40B4-BE49-F238E27FC236}">
-                <a16:creationId xmlns:a16="http://schemas.microsoft.com/office/drawing/2014/main" xmlns="" id="{66FB3B7A-852F-4FDA-8CEA-28497C0DA1ED}"/>
+                <a16:creationId xmlns="" xmlns:a16="http://schemas.microsoft.com/office/drawing/2014/main" id="{66FB3B7A-852F-4FDA-8CEA-28497C0DA1ED}"/>
               </a:ext>
             </a:extLst>
           </p:cNvPr>
@@ -1084,7 +1084,7 @@
           <p:cNvPr id="3" name="Text Placeholder 2">
             <a:extLst>
               <a:ext uri="{FF2B5EF4-FFF2-40B4-BE49-F238E27FC236}">
-                <a16:creationId xmlns:a16="http://schemas.microsoft.com/office/drawing/2014/main" xmlns="" id="{DBBA5503-3DB1-4FDD-BBBB-DA44231A2DFB}"/>
+                <a16:creationId xmlns="" xmlns:a16="http://schemas.microsoft.com/office/drawing/2014/main" id="{DBBA5503-3DB1-4FDD-BBBB-DA44231A2DFB}"/>
               </a:ext>
             </a:extLst>
           </p:cNvPr>
@@ -1209,7 +1209,7 @@
           <p:cNvPr id="4" name="Date Placeholder 3">
             <a:extLst>
               <a:ext uri="{FF2B5EF4-FFF2-40B4-BE49-F238E27FC236}">
-                <a16:creationId xmlns:a16="http://schemas.microsoft.com/office/drawing/2014/main" xmlns="" id="{E6285FEE-4249-44F8-90C9-6C34DF256122}"/>
+                <a16:creationId xmlns="" xmlns:a16="http://schemas.microsoft.com/office/drawing/2014/main" id="{E6285FEE-4249-44F8-90C9-6C34DF256122}"/>
               </a:ext>
             </a:extLst>
           </p:cNvPr>
@@ -1227,7 +1227,7 @@
           <a:p>
             <a:fld id="{89E9D7C5-078A-4914-8EA4-70BA0B43A824}" type="datetimeFigureOut">
               <a:rPr lang="en-GB" smtClean="0"/>
-              <a:t>16/01/2020</a:t>
+              <a:t>16/09/2020</a:t>
             </a:fld>
             <a:endParaRPr lang="en-GB"/>
           </a:p>
@@ -1238,7 +1238,7 @@
           <p:cNvPr id="5" name="Footer Placeholder 4">
             <a:extLst>
               <a:ext uri="{FF2B5EF4-FFF2-40B4-BE49-F238E27FC236}">
-                <a16:creationId xmlns:a16="http://schemas.microsoft.com/office/drawing/2014/main" xmlns="" id="{2116E2FC-1C24-46DA-87CF-AE85742C9C7E}"/>
+                <a16:creationId xmlns="" xmlns:a16="http://schemas.microsoft.com/office/drawing/2014/main" id="{2116E2FC-1C24-46DA-87CF-AE85742C9C7E}"/>
               </a:ext>
             </a:extLst>
           </p:cNvPr>
@@ -1263,7 +1263,7 @@
           <p:cNvPr id="6" name="Slide Number Placeholder 5">
             <a:extLst>
               <a:ext uri="{FF2B5EF4-FFF2-40B4-BE49-F238E27FC236}">
-                <a16:creationId xmlns:a16="http://schemas.microsoft.com/office/drawing/2014/main" xmlns="" id="{048FE4B1-2AF9-4201-A1B2-6C4D1FE32ECD}"/>
+                <a16:creationId xmlns="" xmlns:a16="http://schemas.microsoft.com/office/drawing/2014/main" id="{048FE4B1-2AF9-4201-A1B2-6C4D1FE32ECD}"/>
               </a:ext>
             </a:extLst>
           </p:cNvPr>
@@ -1322,7 +1322,7 @@
           <p:cNvPr id="2" name="Title 1">
             <a:extLst>
               <a:ext uri="{FF2B5EF4-FFF2-40B4-BE49-F238E27FC236}">
-                <a16:creationId xmlns:a16="http://schemas.microsoft.com/office/drawing/2014/main" xmlns="" id="{8AB16E84-8299-4540-9787-5EDC3E67C7EA}"/>
+                <a16:creationId xmlns="" xmlns:a16="http://schemas.microsoft.com/office/drawing/2014/main" id="{8AB16E84-8299-4540-9787-5EDC3E67C7EA}"/>
               </a:ext>
             </a:extLst>
           </p:cNvPr>
@@ -1351,7 +1351,7 @@
           <p:cNvPr id="3" name="Content Placeholder 2">
             <a:extLst>
               <a:ext uri="{FF2B5EF4-FFF2-40B4-BE49-F238E27FC236}">
-                <a16:creationId xmlns:a16="http://schemas.microsoft.com/office/drawing/2014/main" xmlns="" id="{F08AC6BC-3794-4EC6-BC01-1D6A90EFFEE6}"/>
+                <a16:creationId xmlns="" xmlns:a16="http://schemas.microsoft.com/office/drawing/2014/main" id="{F08AC6BC-3794-4EC6-BC01-1D6A90EFFEE6}"/>
               </a:ext>
             </a:extLst>
           </p:cNvPr>
@@ -1414,7 +1414,7 @@
           <p:cNvPr id="4" name="Content Placeholder 3">
             <a:extLst>
               <a:ext uri="{FF2B5EF4-FFF2-40B4-BE49-F238E27FC236}">
-                <a16:creationId xmlns:a16="http://schemas.microsoft.com/office/drawing/2014/main" xmlns="" id="{296A7BE4-E974-4BA0-B077-1A0C30D5C553}"/>
+                <a16:creationId xmlns="" xmlns:a16="http://schemas.microsoft.com/office/drawing/2014/main" id="{296A7BE4-E974-4BA0-B077-1A0C30D5C553}"/>
               </a:ext>
             </a:extLst>
           </p:cNvPr>
@@ -1477,7 +1477,7 @@
           <p:cNvPr id="5" name="Date Placeholder 4">
             <a:extLst>
               <a:ext uri="{FF2B5EF4-FFF2-40B4-BE49-F238E27FC236}">
-                <a16:creationId xmlns:a16="http://schemas.microsoft.com/office/drawing/2014/main" xmlns="" id="{9076246C-7C99-4761-808C-1CE4D350F87C}"/>
+                <a16:creationId xmlns="" xmlns:a16="http://schemas.microsoft.com/office/drawing/2014/main" id="{9076246C-7C99-4761-808C-1CE4D350F87C}"/>
               </a:ext>
             </a:extLst>
           </p:cNvPr>
@@ -1495,7 +1495,7 @@
           <a:p>
             <a:fld id="{89E9D7C5-078A-4914-8EA4-70BA0B43A824}" type="datetimeFigureOut">
               <a:rPr lang="en-GB" smtClean="0"/>
-              <a:t>16/01/2020</a:t>
+              <a:t>16/09/2020</a:t>
             </a:fld>
             <a:endParaRPr lang="en-GB"/>
           </a:p>
@@ -1506,7 +1506,7 @@
           <p:cNvPr id="6" name="Footer Placeholder 5">
             <a:extLst>
               <a:ext uri="{FF2B5EF4-FFF2-40B4-BE49-F238E27FC236}">
-                <a16:creationId xmlns:a16="http://schemas.microsoft.com/office/drawing/2014/main" xmlns="" id="{D4E1C98A-8139-4559-9547-FE9EED864E9B}"/>
+                <a16:creationId xmlns="" xmlns:a16="http://schemas.microsoft.com/office/drawing/2014/main" id="{D4E1C98A-8139-4559-9547-FE9EED864E9B}"/>
               </a:ext>
             </a:extLst>
           </p:cNvPr>
@@ -1531,7 +1531,7 @@
           <p:cNvPr id="7" name="Slide Number Placeholder 6">
             <a:extLst>
               <a:ext uri="{FF2B5EF4-FFF2-40B4-BE49-F238E27FC236}">
-                <a16:creationId xmlns:a16="http://schemas.microsoft.com/office/drawing/2014/main" xmlns="" id="{3373E222-AACA-4E36-8A27-2E8DA1E9024A}"/>
+                <a16:creationId xmlns="" xmlns:a16="http://schemas.microsoft.com/office/drawing/2014/main" id="{3373E222-AACA-4E36-8A27-2E8DA1E9024A}"/>
               </a:ext>
             </a:extLst>
           </p:cNvPr>
@@ -1590,7 +1590,7 @@
           <p:cNvPr id="2" name="Title 1">
             <a:extLst>
               <a:ext uri="{FF2B5EF4-FFF2-40B4-BE49-F238E27FC236}">
-                <a16:creationId xmlns:a16="http://schemas.microsoft.com/office/drawing/2014/main" xmlns="" id="{67F76F63-5559-4FBA-BAB5-D72E088B4EC3}"/>
+                <a16:creationId xmlns="" xmlns:a16="http://schemas.microsoft.com/office/drawing/2014/main" id="{67F76F63-5559-4FBA-BAB5-D72E088B4EC3}"/>
               </a:ext>
             </a:extLst>
           </p:cNvPr>
@@ -1624,7 +1624,7 @@
           <p:cNvPr id="3" name="Text Placeholder 2">
             <a:extLst>
               <a:ext uri="{FF2B5EF4-FFF2-40B4-BE49-F238E27FC236}">
-                <a16:creationId xmlns:a16="http://schemas.microsoft.com/office/drawing/2014/main" xmlns="" id="{6412F419-9E3A-4FE4-A756-A596C4E7448E}"/>
+                <a16:creationId xmlns="" xmlns:a16="http://schemas.microsoft.com/office/drawing/2014/main" id="{6412F419-9E3A-4FE4-A756-A596C4E7448E}"/>
               </a:ext>
             </a:extLst>
           </p:cNvPr>
@@ -1695,7 +1695,7 @@
           <p:cNvPr id="4" name="Content Placeholder 3">
             <a:extLst>
               <a:ext uri="{FF2B5EF4-FFF2-40B4-BE49-F238E27FC236}">
-                <a16:creationId xmlns:a16="http://schemas.microsoft.com/office/drawing/2014/main" xmlns="" id="{5707E9DB-EEEF-4C48-8B49-E49ABDFC2F46}"/>
+                <a16:creationId xmlns="" xmlns:a16="http://schemas.microsoft.com/office/drawing/2014/main" id="{5707E9DB-EEEF-4C48-8B49-E49ABDFC2F46}"/>
               </a:ext>
             </a:extLst>
           </p:cNvPr>
@@ -1758,7 +1758,7 @@
           <p:cNvPr id="5" name="Text Placeholder 4">
             <a:extLst>
               <a:ext uri="{FF2B5EF4-FFF2-40B4-BE49-F238E27FC236}">
-                <a16:creationId xmlns:a16="http://schemas.microsoft.com/office/drawing/2014/main" xmlns="" id="{8EF4D7EC-86E3-404A-B2F2-7BA743153ABF}"/>
+                <a16:creationId xmlns="" xmlns:a16="http://schemas.microsoft.com/office/drawing/2014/main" id="{8EF4D7EC-86E3-404A-B2F2-7BA743153ABF}"/>
               </a:ext>
             </a:extLst>
           </p:cNvPr>
@@ -1829,7 +1829,7 @@
           <p:cNvPr id="6" name="Content Placeholder 5">
             <a:extLst>
               <a:ext uri="{FF2B5EF4-FFF2-40B4-BE49-F238E27FC236}">
-                <a16:creationId xmlns:a16="http://schemas.microsoft.com/office/drawing/2014/main" xmlns="" id="{335EDE8F-0F73-409F-9699-7A4F34427782}"/>
+                <a16:creationId xmlns="" xmlns:a16="http://schemas.microsoft.com/office/drawing/2014/main" id="{335EDE8F-0F73-409F-9699-7A4F34427782}"/>
               </a:ext>
             </a:extLst>
           </p:cNvPr>
@@ -1892,7 +1892,7 @@
           <p:cNvPr id="7" name="Date Placeholder 6">
             <a:extLst>
               <a:ext uri="{FF2B5EF4-FFF2-40B4-BE49-F238E27FC236}">
-                <a16:creationId xmlns:a16="http://schemas.microsoft.com/office/drawing/2014/main" xmlns="" id="{3556666B-21D7-4274-9FED-7E32B134CB86}"/>
+                <a16:creationId xmlns="" xmlns:a16="http://schemas.microsoft.com/office/drawing/2014/main" id="{3556666B-21D7-4274-9FED-7E32B134CB86}"/>
               </a:ext>
             </a:extLst>
           </p:cNvPr>
@@ -1910,7 +1910,7 @@
           <a:p>
             <a:fld id="{89E9D7C5-078A-4914-8EA4-70BA0B43A824}" type="datetimeFigureOut">
               <a:rPr lang="en-GB" smtClean="0"/>
-              <a:t>16/01/2020</a:t>
+              <a:t>16/09/2020</a:t>
             </a:fld>
             <a:endParaRPr lang="en-GB"/>
           </a:p>
@@ -1921,7 +1921,7 @@
           <p:cNvPr id="8" name="Footer Placeholder 7">
             <a:extLst>
               <a:ext uri="{FF2B5EF4-FFF2-40B4-BE49-F238E27FC236}">
-                <a16:creationId xmlns:a16="http://schemas.microsoft.com/office/drawing/2014/main" xmlns="" id="{40D451B3-E03C-4C9B-B9F6-A7647E9A48BC}"/>
+                <a16:creationId xmlns="" xmlns:a16="http://schemas.microsoft.com/office/drawing/2014/main" id="{40D451B3-E03C-4C9B-B9F6-A7647E9A48BC}"/>
               </a:ext>
             </a:extLst>
           </p:cNvPr>
@@ -1946,7 +1946,7 @@
           <p:cNvPr id="9" name="Slide Number Placeholder 8">
             <a:extLst>
               <a:ext uri="{FF2B5EF4-FFF2-40B4-BE49-F238E27FC236}">
-                <a16:creationId xmlns:a16="http://schemas.microsoft.com/office/drawing/2014/main" xmlns="" id="{795A2248-3262-4A25-91E0-22639239ECE3}"/>
+                <a16:creationId xmlns="" xmlns:a16="http://schemas.microsoft.com/office/drawing/2014/main" id="{795A2248-3262-4A25-91E0-22639239ECE3}"/>
               </a:ext>
             </a:extLst>
           </p:cNvPr>
@@ -2005,7 +2005,7 @@
           <p:cNvPr id="2" name="Title 1">
             <a:extLst>
               <a:ext uri="{FF2B5EF4-FFF2-40B4-BE49-F238E27FC236}">
-                <a16:creationId xmlns:a16="http://schemas.microsoft.com/office/drawing/2014/main" xmlns="" id="{65BCE9D1-FF33-4BF2-8218-6DFCAA2F5E2D}"/>
+                <a16:creationId xmlns="" xmlns:a16="http://schemas.microsoft.com/office/drawing/2014/main" id="{65BCE9D1-FF33-4BF2-8218-6DFCAA2F5E2D}"/>
               </a:ext>
             </a:extLst>
           </p:cNvPr>
@@ -2034,7 +2034,7 @@
           <p:cNvPr id="3" name="Date Placeholder 2">
             <a:extLst>
               <a:ext uri="{FF2B5EF4-FFF2-40B4-BE49-F238E27FC236}">
-                <a16:creationId xmlns:a16="http://schemas.microsoft.com/office/drawing/2014/main" xmlns="" id="{C6B3D39E-2646-4A23-A6B0-67B3C6951E9B}"/>
+                <a16:creationId xmlns="" xmlns:a16="http://schemas.microsoft.com/office/drawing/2014/main" id="{C6B3D39E-2646-4A23-A6B0-67B3C6951E9B}"/>
               </a:ext>
             </a:extLst>
           </p:cNvPr>
@@ -2052,7 +2052,7 @@
           <a:p>
             <a:fld id="{89E9D7C5-078A-4914-8EA4-70BA0B43A824}" type="datetimeFigureOut">
               <a:rPr lang="en-GB" smtClean="0"/>
-              <a:t>16/01/2020</a:t>
+              <a:t>16/09/2020</a:t>
             </a:fld>
             <a:endParaRPr lang="en-GB"/>
           </a:p>
@@ -2063,7 +2063,7 @@
           <p:cNvPr id="4" name="Footer Placeholder 3">
             <a:extLst>
               <a:ext uri="{FF2B5EF4-FFF2-40B4-BE49-F238E27FC236}">
-                <a16:creationId xmlns:a16="http://schemas.microsoft.com/office/drawing/2014/main" xmlns="" id="{8FCD3F44-2C6C-4E82-91C6-9B19BC017766}"/>
+                <a16:creationId xmlns="" xmlns:a16="http://schemas.microsoft.com/office/drawing/2014/main" id="{8FCD3F44-2C6C-4E82-91C6-9B19BC017766}"/>
               </a:ext>
             </a:extLst>
           </p:cNvPr>
@@ -2088,7 +2088,7 @@
           <p:cNvPr id="5" name="Slide Number Placeholder 4">
             <a:extLst>
               <a:ext uri="{FF2B5EF4-FFF2-40B4-BE49-F238E27FC236}">
-                <a16:creationId xmlns:a16="http://schemas.microsoft.com/office/drawing/2014/main" xmlns="" id="{F0DB5523-78ED-481E-AD64-15302623E22F}"/>
+                <a16:creationId xmlns="" xmlns:a16="http://schemas.microsoft.com/office/drawing/2014/main" id="{F0DB5523-78ED-481E-AD64-15302623E22F}"/>
               </a:ext>
             </a:extLst>
           </p:cNvPr>
@@ -2147,7 +2147,7 @@
           <p:cNvPr id="2" name="Date Placeholder 1">
             <a:extLst>
               <a:ext uri="{FF2B5EF4-FFF2-40B4-BE49-F238E27FC236}">
-                <a16:creationId xmlns:a16="http://schemas.microsoft.com/office/drawing/2014/main" xmlns="" id="{D15BAEB4-143B-430D-9B97-C94170CB4810}"/>
+                <a16:creationId xmlns="" xmlns:a16="http://schemas.microsoft.com/office/drawing/2014/main" id="{D15BAEB4-143B-430D-9B97-C94170CB4810}"/>
               </a:ext>
             </a:extLst>
           </p:cNvPr>
@@ -2165,7 +2165,7 @@
           <a:p>
             <a:fld id="{89E9D7C5-078A-4914-8EA4-70BA0B43A824}" type="datetimeFigureOut">
               <a:rPr lang="en-GB" smtClean="0"/>
-              <a:t>16/01/2020</a:t>
+              <a:t>16/09/2020</a:t>
             </a:fld>
             <a:endParaRPr lang="en-GB"/>
           </a:p>
@@ -2176,7 +2176,7 @@
           <p:cNvPr id="3" name="Footer Placeholder 2">
             <a:extLst>
               <a:ext uri="{FF2B5EF4-FFF2-40B4-BE49-F238E27FC236}">
-                <a16:creationId xmlns:a16="http://schemas.microsoft.com/office/drawing/2014/main" xmlns="" id="{5318D838-5953-4A57-9132-350793E2D15A}"/>
+                <a16:creationId xmlns="" xmlns:a16="http://schemas.microsoft.com/office/drawing/2014/main" id="{5318D838-5953-4A57-9132-350793E2D15A}"/>
               </a:ext>
             </a:extLst>
           </p:cNvPr>
@@ -2201,7 +2201,7 @@
           <p:cNvPr id="4" name="Slide Number Placeholder 3">
             <a:extLst>
               <a:ext uri="{FF2B5EF4-FFF2-40B4-BE49-F238E27FC236}">
-                <a16:creationId xmlns:a16="http://schemas.microsoft.com/office/drawing/2014/main" xmlns="" id="{84A229B6-C246-4E94-8521-6D51B06D9824}"/>
+                <a16:creationId xmlns="" xmlns:a16="http://schemas.microsoft.com/office/drawing/2014/main" id="{84A229B6-C246-4E94-8521-6D51B06D9824}"/>
               </a:ext>
             </a:extLst>
           </p:cNvPr>
@@ -2260,7 +2260,7 @@
           <p:cNvPr id="2" name="Title 1">
             <a:extLst>
               <a:ext uri="{FF2B5EF4-FFF2-40B4-BE49-F238E27FC236}">
-                <a16:creationId xmlns:a16="http://schemas.microsoft.com/office/drawing/2014/main" xmlns="" id="{E3A518A6-5EF0-4446-AF21-056B993EAAEC}"/>
+                <a16:creationId xmlns="" xmlns:a16="http://schemas.microsoft.com/office/drawing/2014/main" id="{E3A518A6-5EF0-4446-AF21-056B993EAAEC}"/>
               </a:ext>
             </a:extLst>
           </p:cNvPr>
@@ -2298,7 +2298,7 @@
           <p:cNvPr id="3" name="Content Placeholder 2">
             <a:extLst>
               <a:ext uri="{FF2B5EF4-FFF2-40B4-BE49-F238E27FC236}">
-                <a16:creationId xmlns:a16="http://schemas.microsoft.com/office/drawing/2014/main" xmlns="" id="{1815D955-D6F4-4D42-A074-14A60AB0CB9C}"/>
+                <a16:creationId xmlns="" xmlns:a16="http://schemas.microsoft.com/office/drawing/2014/main" id="{1815D955-D6F4-4D42-A074-14A60AB0CB9C}"/>
               </a:ext>
             </a:extLst>
           </p:cNvPr>
@@ -2389,7 +2389,7 @@
           <p:cNvPr id="4" name="Text Placeholder 3">
             <a:extLst>
               <a:ext uri="{FF2B5EF4-FFF2-40B4-BE49-F238E27FC236}">
-                <a16:creationId xmlns:a16="http://schemas.microsoft.com/office/drawing/2014/main" xmlns="" id="{6A1D194D-B2CE-421E-892E-38D12B9885B0}"/>
+                <a16:creationId xmlns="" xmlns:a16="http://schemas.microsoft.com/office/drawing/2014/main" id="{6A1D194D-B2CE-421E-892E-38D12B9885B0}"/>
               </a:ext>
             </a:extLst>
           </p:cNvPr>
@@ -2460,7 +2460,7 @@
           <p:cNvPr id="5" name="Date Placeholder 4">
             <a:extLst>
               <a:ext uri="{FF2B5EF4-FFF2-40B4-BE49-F238E27FC236}">
-                <a16:creationId xmlns:a16="http://schemas.microsoft.com/office/drawing/2014/main" xmlns="" id="{21AC63CC-5D43-458B-A70A-6C9B71C31943}"/>
+                <a16:creationId xmlns="" xmlns:a16="http://schemas.microsoft.com/office/drawing/2014/main" id="{21AC63CC-5D43-458B-A70A-6C9B71C31943}"/>
               </a:ext>
             </a:extLst>
           </p:cNvPr>
@@ -2478,7 +2478,7 @@
           <a:p>
             <a:fld id="{89E9D7C5-078A-4914-8EA4-70BA0B43A824}" type="datetimeFigureOut">
               <a:rPr lang="en-GB" smtClean="0"/>
-              <a:t>16/01/2020</a:t>
+              <a:t>16/09/2020</a:t>
             </a:fld>
             <a:endParaRPr lang="en-GB"/>
           </a:p>
@@ -2489,7 +2489,7 @@
           <p:cNvPr id="6" name="Footer Placeholder 5">
             <a:extLst>
               <a:ext uri="{FF2B5EF4-FFF2-40B4-BE49-F238E27FC236}">
-                <a16:creationId xmlns:a16="http://schemas.microsoft.com/office/drawing/2014/main" xmlns="" id="{61EEB5B6-EA39-4951-8C95-14DC91F7C6B3}"/>
+                <a16:creationId xmlns="" xmlns:a16="http://schemas.microsoft.com/office/drawing/2014/main" id="{61EEB5B6-EA39-4951-8C95-14DC91F7C6B3}"/>
               </a:ext>
             </a:extLst>
           </p:cNvPr>
@@ -2514,7 +2514,7 @@
           <p:cNvPr id="7" name="Slide Number Placeholder 6">
             <a:extLst>
               <a:ext uri="{FF2B5EF4-FFF2-40B4-BE49-F238E27FC236}">
-                <a16:creationId xmlns:a16="http://schemas.microsoft.com/office/drawing/2014/main" xmlns="" id="{1B1B027B-A706-43B5-BBD0-7CA98CB93112}"/>
+                <a16:creationId xmlns="" xmlns:a16="http://schemas.microsoft.com/office/drawing/2014/main" id="{1B1B027B-A706-43B5-BBD0-7CA98CB93112}"/>
               </a:ext>
             </a:extLst>
           </p:cNvPr>
@@ -2573,7 +2573,7 @@
           <p:cNvPr id="2" name="Title 1">
             <a:extLst>
               <a:ext uri="{FF2B5EF4-FFF2-40B4-BE49-F238E27FC236}">
-                <a16:creationId xmlns:a16="http://schemas.microsoft.com/office/drawing/2014/main" xmlns="" id="{CDE707A4-58D8-44EC-AFA0-BA61473B609D}"/>
+                <a16:creationId xmlns="" xmlns:a16="http://schemas.microsoft.com/office/drawing/2014/main" id="{CDE707A4-58D8-44EC-AFA0-BA61473B609D}"/>
               </a:ext>
             </a:extLst>
           </p:cNvPr>
@@ -2611,7 +2611,7 @@
           <p:cNvPr id="3" name="Picture Placeholder 2">
             <a:extLst>
               <a:ext uri="{FF2B5EF4-FFF2-40B4-BE49-F238E27FC236}">
-                <a16:creationId xmlns:a16="http://schemas.microsoft.com/office/drawing/2014/main" xmlns="" id="{988C695C-EC3D-4478-A98D-11B91F3110D2}"/>
+                <a16:creationId xmlns="" xmlns:a16="http://schemas.microsoft.com/office/drawing/2014/main" id="{988C695C-EC3D-4478-A98D-11B91F3110D2}"/>
               </a:ext>
             </a:extLst>
           </p:cNvPr>
@@ -2678,7 +2678,7 @@
           <p:cNvPr id="4" name="Text Placeholder 3">
             <a:extLst>
               <a:ext uri="{FF2B5EF4-FFF2-40B4-BE49-F238E27FC236}">
-                <a16:creationId xmlns:a16="http://schemas.microsoft.com/office/drawing/2014/main" xmlns="" id="{27A6F9E6-D8B7-4E83-AACF-D2459417EE98}"/>
+                <a16:creationId xmlns="" xmlns:a16="http://schemas.microsoft.com/office/drawing/2014/main" id="{27A6F9E6-D8B7-4E83-AACF-D2459417EE98}"/>
               </a:ext>
             </a:extLst>
           </p:cNvPr>
@@ -2749,7 +2749,7 @@
           <p:cNvPr id="5" name="Date Placeholder 4">
             <a:extLst>
               <a:ext uri="{FF2B5EF4-FFF2-40B4-BE49-F238E27FC236}">
-                <a16:creationId xmlns:a16="http://schemas.microsoft.com/office/drawing/2014/main" xmlns="" id="{EC0CC1FA-118B-406D-BFB8-8E1F64B8FC1F}"/>
+                <a16:creationId xmlns="" xmlns:a16="http://schemas.microsoft.com/office/drawing/2014/main" id="{EC0CC1FA-118B-406D-BFB8-8E1F64B8FC1F}"/>
               </a:ext>
             </a:extLst>
           </p:cNvPr>
@@ -2767,7 +2767,7 @@
           <a:p>
             <a:fld id="{89E9D7C5-078A-4914-8EA4-70BA0B43A824}" type="datetimeFigureOut">
               <a:rPr lang="en-GB" smtClean="0"/>
-              <a:t>16/01/2020</a:t>
+              <a:t>16/09/2020</a:t>
             </a:fld>
             <a:endParaRPr lang="en-GB"/>
           </a:p>
@@ -2778,7 +2778,7 @@
           <p:cNvPr id="6" name="Footer Placeholder 5">
             <a:extLst>
               <a:ext uri="{FF2B5EF4-FFF2-40B4-BE49-F238E27FC236}">
-                <a16:creationId xmlns:a16="http://schemas.microsoft.com/office/drawing/2014/main" xmlns="" id="{D2088071-E5C4-45FC-A92B-A9C158452DB0}"/>
+                <a16:creationId xmlns="" xmlns:a16="http://schemas.microsoft.com/office/drawing/2014/main" id="{D2088071-E5C4-45FC-A92B-A9C158452DB0}"/>
               </a:ext>
             </a:extLst>
           </p:cNvPr>
@@ -2803,7 +2803,7 @@
           <p:cNvPr id="7" name="Slide Number Placeholder 6">
             <a:extLst>
               <a:ext uri="{FF2B5EF4-FFF2-40B4-BE49-F238E27FC236}">
-                <a16:creationId xmlns:a16="http://schemas.microsoft.com/office/drawing/2014/main" xmlns="" id="{D288ED0B-B6CE-4E2D-AE56-66F052139F3C}"/>
+                <a16:creationId xmlns="" xmlns:a16="http://schemas.microsoft.com/office/drawing/2014/main" id="{D288ED0B-B6CE-4E2D-AE56-66F052139F3C}"/>
               </a:ext>
             </a:extLst>
           </p:cNvPr>
@@ -2867,7 +2867,7 @@
           <p:cNvPr id="2" name="Title Placeholder 1">
             <a:extLst>
               <a:ext uri="{FF2B5EF4-FFF2-40B4-BE49-F238E27FC236}">
-                <a16:creationId xmlns:a16="http://schemas.microsoft.com/office/drawing/2014/main" xmlns="" id="{3C51CFFD-B4AA-4CBC-984B-2D67F7477A40}"/>
+                <a16:creationId xmlns="" xmlns:a16="http://schemas.microsoft.com/office/drawing/2014/main" id="{3C51CFFD-B4AA-4CBC-984B-2D67F7477A40}"/>
               </a:ext>
             </a:extLst>
           </p:cNvPr>
@@ -2906,7 +2906,7 @@
           <p:cNvPr id="3" name="Text Placeholder 2">
             <a:extLst>
               <a:ext uri="{FF2B5EF4-FFF2-40B4-BE49-F238E27FC236}">
-                <a16:creationId xmlns:a16="http://schemas.microsoft.com/office/drawing/2014/main" xmlns="" id="{8E6EB4DA-4497-4205-BE8A-49CECB2288F8}"/>
+                <a16:creationId xmlns="" xmlns:a16="http://schemas.microsoft.com/office/drawing/2014/main" id="{8E6EB4DA-4497-4205-BE8A-49CECB2288F8}"/>
               </a:ext>
             </a:extLst>
           </p:cNvPr>
@@ -2974,7 +2974,7 @@
           <p:cNvPr id="4" name="Date Placeholder 3">
             <a:extLst>
               <a:ext uri="{FF2B5EF4-FFF2-40B4-BE49-F238E27FC236}">
-                <a16:creationId xmlns:a16="http://schemas.microsoft.com/office/drawing/2014/main" xmlns="" id="{AA74CF1B-8266-4873-8AB0-9680B0F02FE6}"/>
+                <a16:creationId xmlns="" xmlns:a16="http://schemas.microsoft.com/office/drawing/2014/main" id="{AA74CF1B-8266-4873-8AB0-9680B0F02FE6}"/>
               </a:ext>
             </a:extLst>
           </p:cNvPr>
@@ -3010,7 +3010,7 @@
           <a:p>
             <a:fld id="{89E9D7C5-078A-4914-8EA4-70BA0B43A824}" type="datetimeFigureOut">
               <a:rPr lang="en-GB" smtClean="0"/>
-              <a:t>16/01/2020</a:t>
+              <a:t>16/09/2020</a:t>
             </a:fld>
             <a:endParaRPr lang="en-GB"/>
           </a:p>
@@ -3021,7 +3021,7 @@
           <p:cNvPr id="5" name="Footer Placeholder 4">
             <a:extLst>
               <a:ext uri="{FF2B5EF4-FFF2-40B4-BE49-F238E27FC236}">
-                <a16:creationId xmlns:a16="http://schemas.microsoft.com/office/drawing/2014/main" xmlns="" id="{CF6C23BD-3B9C-458A-A993-7DDAE5312A1C}"/>
+                <a16:creationId xmlns="" xmlns:a16="http://schemas.microsoft.com/office/drawing/2014/main" id="{CF6C23BD-3B9C-458A-A993-7DDAE5312A1C}"/>
               </a:ext>
             </a:extLst>
           </p:cNvPr>
@@ -3064,7 +3064,7 @@
           <p:cNvPr id="6" name="Slide Number Placeholder 5">
             <a:extLst>
               <a:ext uri="{FF2B5EF4-FFF2-40B4-BE49-F238E27FC236}">
-                <a16:creationId xmlns:a16="http://schemas.microsoft.com/office/drawing/2014/main" xmlns="" id="{7FB36786-3EBD-46DE-B82E-77B386238785}"/>
+                <a16:creationId xmlns="" xmlns:a16="http://schemas.microsoft.com/office/drawing/2014/main" id="{7FB36786-3EBD-46DE-B82E-77B386238785}"/>
               </a:ext>
             </a:extLst>
           </p:cNvPr>
@@ -3111,7 +3111,7 @@
           <p:cNvPr id="7" name="hc">
             <a:extLst>
               <a:ext uri="{FF2B5EF4-FFF2-40B4-BE49-F238E27FC236}">
-                <a16:creationId xmlns:a16="http://schemas.microsoft.com/office/drawing/2014/main" xmlns="" id="{AD3E9EB8-D02C-40CD-8B31-31461614F5D0}"/>
+                <a16:creationId xmlns="" xmlns:a16="http://schemas.microsoft.com/office/drawing/2014/main" id="{AD3E9EB8-D02C-40CD-8B31-31461614F5D0}"/>
               </a:ext>
             </a:extLst>
           </p:cNvPr>
@@ -3149,7 +3149,7 @@
           <p:cNvPr id="8" name="fc">
             <a:extLst>
               <a:ext uri="{FF2B5EF4-FFF2-40B4-BE49-F238E27FC236}">
-                <a16:creationId xmlns:a16="http://schemas.microsoft.com/office/drawing/2014/main" xmlns="" id="{0936059E-9925-4754-A1A7-253D40A9684D}"/>
+                <a16:creationId xmlns="" xmlns:a16="http://schemas.microsoft.com/office/drawing/2014/main" id="{0936059E-9925-4754-A1A7-253D40A9684D}"/>
               </a:ext>
             </a:extLst>
           </p:cNvPr>
@@ -3556,7 +3556,7 @@
           <p:cNvPr id="95" name="Straight Arrow Connector 94">
             <a:extLst>
               <a:ext uri="{FF2B5EF4-FFF2-40B4-BE49-F238E27FC236}">
-                <a16:creationId xmlns:a16="http://schemas.microsoft.com/office/drawing/2014/main" xmlns="" id="{4FE9E570-253C-4922-BA49-B370F36F4CAA}"/>
+                <a16:creationId xmlns="" xmlns:a16="http://schemas.microsoft.com/office/drawing/2014/main" id="{4FE9E570-253C-4922-BA49-B370F36F4CAA}"/>
               </a:ext>
             </a:extLst>
           </p:cNvPr>
@@ -3602,7 +3602,7 @@
           <p:cNvPr id="143" name="Straight Arrow Connector 142">
             <a:extLst>
               <a:ext uri="{FF2B5EF4-FFF2-40B4-BE49-F238E27FC236}">
-                <a16:creationId xmlns:a16="http://schemas.microsoft.com/office/drawing/2014/main" xmlns="" id="{4FE9E570-253C-4922-BA49-B370F36F4CAA}"/>
+                <a16:creationId xmlns="" xmlns:a16="http://schemas.microsoft.com/office/drawing/2014/main" id="{4FE9E570-253C-4922-BA49-B370F36F4CAA}"/>
               </a:ext>
             </a:extLst>
           </p:cNvPr>
@@ -3648,7 +3648,7 @@
           <p:cNvPr id="73" name="Straight Arrow Connector 72">
             <a:extLst>
               <a:ext uri="{FF2B5EF4-FFF2-40B4-BE49-F238E27FC236}">
-                <a16:creationId xmlns:a16="http://schemas.microsoft.com/office/drawing/2014/main" xmlns="" id="{4FE9E570-253C-4922-BA49-B370F36F4CAA}"/>
+                <a16:creationId xmlns="" xmlns:a16="http://schemas.microsoft.com/office/drawing/2014/main" id="{4FE9E570-253C-4922-BA49-B370F36F4CAA}"/>
               </a:ext>
             </a:extLst>
           </p:cNvPr>
@@ -3694,7 +3694,7 @@
           <p:cNvPr id="70" name="Straight Arrow Connector 69">
             <a:extLst>
               <a:ext uri="{FF2B5EF4-FFF2-40B4-BE49-F238E27FC236}">
-                <a16:creationId xmlns:a16="http://schemas.microsoft.com/office/drawing/2014/main" xmlns="" id="{4FE9E570-253C-4922-BA49-B370F36F4CAA}"/>
+                <a16:creationId xmlns="" xmlns:a16="http://schemas.microsoft.com/office/drawing/2014/main" id="{4FE9E570-253C-4922-BA49-B370F36F4CAA}"/>
               </a:ext>
             </a:extLst>
           </p:cNvPr>
@@ -3740,7 +3740,7 @@
           <p:cNvPr id="52" name="Rectangle 51">
             <a:extLst>
               <a:ext uri="{FF2B5EF4-FFF2-40B4-BE49-F238E27FC236}">
-                <a16:creationId xmlns:a16="http://schemas.microsoft.com/office/drawing/2014/main" xmlns="" id="{FBD453A1-A3AF-40EE-837B-2CADAC3A6221}"/>
+                <a16:creationId xmlns="" xmlns:a16="http://schemas.microsoft.com/office/drawing/2014/main" id="{FBD453A1-A3AF-40EE-837B-2CADAC3A6221}"/>
               </a:ext>
             </a:extLst>
           </p:cNvPr>
@@ -3801,7 +3801,7 @@
           <p:cNvPr id="20" name="Rectangle 19">
             <a:extLst>
               <a:ext uri="{FF2B5EF4-FFF2-40B4-BE49-F238E27FC236}">
-                <a16:creationId xmlns:a16="http://schemas.microsoft.com/office/drawing/2014/main" xmlns="" id="{FBD453A1-A3AF-40EE-837B-2CADAC3A6221}"/>
+                <a16:creationId xmlns="" xmlns:a16="http://schemas.microsoft.com/office/drawing/2014/main" id="{FBD453A1-A3AF-40EE-837B-2CADAC3A6221}"/>
               </a:ext>
             </a:extLst>
           </p:cNvPr>
@@ -3855,7 +3855,7 @@
           <p:cNvPr id="5" name="Rectangle 4">
             <a:extLst>
               <a:ext uri="{FF2B5EF4-FFF2-40B4-BE49-F238E27FC236}">
-                <a16:creationId xmlns:a16="http://schemas.microsoft.com/office/drawing/2014/main" xmlns="" id="{FBD453A1-A3AF-40EE-837B-2CADAC3A6221}"/>
+                <a16:creationId xmlns="" xmlns:a16="http://schemas.microsoft.com/office/drawing/2014/main" id="{FBD453A1-A3AF-40EE-837B-2CADAC3A6221}"/>
               </a:ext>
             </a:extLst>
           </p:cNvPr>
@@ -3912,8 +3912,85 @@
                   </a:schemeClr>
                 </a:solidFill>
               </a:rPr>
-              <a:t>Each input file has the information of what you want to do with each dataset. (e.g.: how many peaks to save in each data cube, which adducts to look for, which MVA to run)</a:t>
-            </a:r>
+              <a:t>Each input file has the information </a:t>
+            </a:r>
+            <a:r>
+              <a:rPr lang="en-GB" sz="700" dirty="0" smtClean="0">
+                <a:solidFill>
+                  <a:schemeClr val="accent3">
+                    <a:lumMod val="50000"/>
+                  </a:schemeClr>
+                </a:solidFill>
+              </a:rPr>
+              <a:t>regarding what to </a:t>
+            </a:r>
+            <a:r>
+              <a:rPr lang="en-GB" sz="700" dirty="0" smtClean="0">
+                <a:solidFill>
+                  <a:schemeClr val="accent3">
+                    <a:lumMod val="50000"/>
+                  </a:schemeClr>
+                </a:solidFill>
+              </a:rPr>
+              <a:t>do with each dataset. </a:t>
+            </a:r>
+            <a:r>
+              <a:rPr lang="en-GB" sz="700" dirty="0" smtClean="0">
+                <a:solidFill>
+                  <a:schemeClr val="accent3">
+                    <a:lumMod val="50000"/>
+                  </a:schemeClr>
+                </a:solidFill>
+              </a:rPr>
+              <a:t>E.g</a:t>
+            </a:r>
+            <a:r>
+              <a:rPr lang="en-GB" sz="700" dirty="0" smtClean="0">
+                <a:solidFill>
+                  <a:schemeClr val="accent3">
+                    <a:lumMod val="50000"/>
+                  </a:schemeClr>
+                </a:solidFill>
+              </a:rPr>
+              <a:t>.: how many peaks to save in each </a:t>
+            </a:r>
+            <a:r>
+              <a:rPr lang="en-GB" sz="700" dirty="0" err="1" smtClean="0">
+                <a:solidFill>
+                  <a:schemeClr val="accent3">
+                    <a:lumMod val="50000"/>
+                  </a:schemeClr>
+                </a:solidFill>
+              </a:rPr>
+              <a:t>datacube</a:t>
+            </a:r>
+            <a:r>
+              <a:rPr lang="en-GB" sz="700" dirty="0" smtClean="0">
+                <a:solidFill>
+                  <a:schemeClr val="accent3">
+                    <a:lumMod val="50000"/>
+                  </a:schemeClr>
+                </a:solidFill>
+              </a:rPr>
+              <a:t>, which adducts to look for, which MVA to </a:t>
+            </a:r>
+            <a:r>
+              <a:rPr lang="en-GB" sz="700" dirty="0" smtClean="0">
+                <a:solidFill>
+                  <a:schemeClr val="accent3">
+                    <a:lumMod val="50000"/>
+                  </a:schemeClr>
+                </a:solidFill>
+              </a:rPr>
+              <a:t>run.</a:t>
+            </a:r>
+            <a:endParaRPr lang="en-GB" sz="700" dirty="0" smtClean="0">
+              <a:solidFill>
+                <a:schemeClr val="accent3">
+                  <a:lumMod val="50000"/>
+                </a:schemeClr>
+              </a:solidFill>
+            </a:endParaRPr>
           </a:p>
         </p:txBody>
       </p:sp>
@@ -3922,7 +3999,7 @@
           <p:cNvPr id="10" name="Rectangle 9">
             <a:extLst>
               <a:ext uri="{FF2B5EF4-FFF2-40B4-BE49-F238E27FC236}">
-                <a16:creationId xmlns:a16="http://schemas.microsoft.com/office/drawing/2014/main" xmlns="" id="{6B8F8C16-8BF5-44CE-A165-28895472E11E}"/>
+                <a16:creationId xmlns="" xmlns:a16="http://schemas.microsoft.com/office/drawing/2014/main" id="{6B8F8C16-8BF5-44CE-A165-28895472E11E}"/>
               </a:ext>
             </a:extLst>
           </p:cNvPr>
@@ -3932,7 +4009,7 @@
         <p:spPr>
           <a:xfrm>
             <a:off x="1584284" y="466801"/>
-            <a:ext cx="947423" cy="781396"/>
+            <a:ext cx="1080000" cy="781396"/>
           </a:xfrm>
           <a:prstGeom prst="rect">
             <a:avLst/>
@@ -3966,15 +4043,35 @@
             <a:pPr algn="ctr"/>
             <a:r>
               <a:rPr lang="en-GB" sz="1000" dirty="0" smtClean="0"/>
-              <a:t>      Saving data (</a:t>
-            </a:r>
-            <a:r>
-              <a:rPr lang="en-GB" sz="1000" b="1" dirty="0" err="1" smtClean="0"/>
+              <a:t>    Save </a:t>
+            </a:r>
+            <a:r>
+              <a:rPr lang="en-GB" sz="1000" dirty="0" smtClean="0"/>
+              <a:t>data </a:t>
+            </a:r>
+            <a:r>
+              <a:rPr lang="en-GB" sz="1000" dirty="0" smtClean="0"/>
+              <a:t>files (</a:t>
+            </a:r>
+            <a:r>
+              <a:rPr lang="en-GB" sz="1000" dirty="0" err="1" smtClean="0"/>
               <a:t>imzMLs</a:t>
             </a:r>
             <a:r>
               <a:rPr lang="en-GB" sz="1000" dirty="0" smtClean="0"/>
-              <a:t>) in folders by modality and polarity</a:t>
+              <a:t> &amp; </a:t>
+            </a:r>
+            <a:r>
+              <a:rPr lang="en-GB" sz="1000" dirty="0" err="1" smtClean="0"/>
+              <a:t>ibds</a:t>
+            </a:r>
+            <a:r>
+              <a:rPr lang="en-GB" sz="1000" dirty="0" smtClean="0"/>
+              <a:t>) </a:t>
+            </a:r>
+            <a:r>
+              <a:rPr lang="en-GB" sz="1000" dirty="0" smtClean="0"/>
+              <a:t>in folders by modality and polarity</a:t>
             </a:r>
             <a:endParaRPr lang="en-GB" sz="1000" dirty="0"/>
           </a:p>
@@ -3985,7 +4082,7 @@
           <p:cNvPr id="11" name="Rectangle 10">
             <a:extLst>
               <a:ext uri="{FF2B5EF4-FFF2-40B4-BE49-F238E27FC236}">
-                <a16:creationId xmlns:a16="http://schemas.microsoft.com/office/drawing/2014/main" xmlns="" id="{FBD453A1-A3AF-40EE-837B-2CADAC3A6221}"/>
+                <a16:creationId xmlns="" xmlns:a16="http://schemas.microsoft.com/office/drawing/2014/main" id="{FBD453A1-A3AF-40EE-837B-2CADAC3A6221}"/>
               </a:ext>
             </a:extLst>
           </p:cNvPr>
@@ -3994,8 +4091,8 @@
         </p:nvSpPr>
         <p:spPr>
           <a:xfrm>
-            <a:off x="1584284" y="1292723"/>
-            <a:ext cx="947423" cy="781396"/>
+            <a:off x="1584283" y="1292723"/>
+            <a:ext cx="1080000" cy="781396"/>
           </a:xfrm>
           <a:prstGeom prst="rect">
             <a:avLst/>
@@ -4029,7 +4126,19 @@
             <a:pPr algn="ctr"/>
             <a:r>
               <a:rPr lang="en-GB" sz="1000" dirty="0" smtClean="0"/>
-              <a:t>     Fill in an input file by folder of data</a:t>
+              <a:t>     Fill </a:t>
+            </a:r>
+            <a:r>
+              <a:rPr lang="en-GB" sz="1000" dirty="0" smtClean="0"/>
+              <a:t>in an input </a:t>
+            </a:r>
+            <a:r>
+              <a:rPr lang="en-GB" sz="1000" dirty="0" smtClean="0"/>
+              <a:t>file (excel) for each folder </a:t>
+            </a:r>
+            <a:r>
+              <a:rPr lang="en-GB" sz="1000" dirty="0" smtClean="0"/>
+              <a:t>of data</a:t>
             </a:r>
           </a:p>
         </p:txBody>
@@ -4039,7 +4148,7 @@
           <p:cNvPr id="12" name="Rectangle 11">
             <a:extLst>
               <a:ext uri="{FF2B5EF4-FFF2-40B4-BE49-F238E27FC236}">
-                <a16:creationId xmlns:a16="http://schemas.microsoft.com/office/drawing/2014/main" xmlns="" id="{CEF11C59-0A30-413B-A138-5882976AD0E8}"/>
+                <a16:creationId xmlns="" xmlns:a16="http://schemas.microsoft.com/office/drawing/2014/main" id="{CEF11C59-0A30-413B-A138-5882976AD0E8}"/>
               </a:ext>
             </a:extLst>
           </p:cNvPr>
@@ -4049,7 +4158,7 @@
         <p:spPr>
           <a:xfrm>
             <a:off x="1584284" y="2417228"/>
-            <a:ext cx="947423" cy="781396"/>
+            <a:ext cx="1079999" cy="781396"/>
           </a:xfrm>
           <a:prstGeom prst="rect">
             <a:avLst/>
@@ -4083,7 +4192,15 @@
             <a:pPr algn="ctr"/>
             <a:r>
               <a:rPr lang="en-GB" sz="1000" dirty="0" smtClean="0"/>
-              <a:t>Copy the master script to one of your personal folders</a:t>
+              <a:t>     Save a </a:t>
+            </a:r>
+            <a:r>
+              <a:rPr lang="en-GB" sz="1000" dirty="0" smtClean="0"/>
+              <a:t>master script </a:t>
+            </a:r>
+            <a:r>
+              <a:rPr lang="en-GB" sz="1000" dirty="0" smtClean="0"/>
+              <a:t>in a location of your choice</a:t>
             </a:r>
             <a:endParaRPr lang="en-GB" sz="1000" dirty="0"/>
           </a:p>
@@ -4094,7 +4211,7 @@
           <p:cNvPr id="22" name="Rectangle 21">
             <a:extLst>
               <a:ext uri="{FF2B5EF4-FFF2-40B4-BE49-F238E27FC236}">
-                <a16:creationId xmlns:a16="http://schemas.microsoft.com/office/drawing/2014/main" xmlns="" id="{FBD453A1-A3AF-40EE-837B-2CADAC3A6221}"/>
+                <a16:creationId xmlns="" xmlns:a16="http://schemas.microsoft.com/office/drawing/2014/main" id="{FBD453A1-A3AF-40EE-837B-2CADAC3A6221}"/>
               </a:ext>
             </a:extLst>
           </p:cNvPr>
@@ -4150,7 +4267,7 @@
           <p:cNvPr id="23" name="Rectangle 22">
             <a:extLst>
               <a:ext uri="{FF2B5EF4-FFF2-40B4-BE49-F238E27FC236}">
-                <a16:creationId xmlns:a16="http://schemas.microsoft.com/office/drawing/2014/main" xmlns="" id="{FBD453A1-A3AF-40EE-837B-2CADAC3A6221}"/>
+                <a16:creationId xmlns="" xmlns:a16="http://schemas.microsoft.com/office/drawing/2014/main" id="{FBD453A1-A3AF-40EE-837B-2CADAC3A6221}"/>
               </a:ext>
             </a:extLst>
           </p:cNvPr>
@@ -4212,7 +4329,7 @@
           <p:cNvPr id="24" name="Rectangle 23">
             <a:extLst>
               <a:ext uri="{FF2B5EF4-FFF2-40B4-BE49-F238E27FC236}">
-                <a16:creationId xmlns:a16="http://schemas.microsoft.com/office/drawing/2014/main" xmlns="" id="{FBD453A1-A3AF-40EE-837B-2CADAC3A6221}"/>
+                <a16:creationId xmlns="" xmlns:a16="http://schemas.microsoft.com/office/drawing/2014/main" id="{FBD453A1-A3AF-40EE-837B-2CADAC3A6221}"/>
               </a:ext>
             </a:extLst>
           </p:cNvPr>
@@ -4256,13 +4373,8 @@
             <a:pPr algn="ctr"/>
             <a:r>
               <a:rPr lang="en-GB" sz="1200" dirty="0" smtClean="0"/>
-              <a:t>Matching representative spectra with lists of interesting molecules and </a:t>
-            </a:r>
-            <a:r>
-              <a:rPr lang="en-GB" sz="1200" dirty="0" smtClean="0"/>
-              <a:t>databases</a:t>
-            </a:r>
-            <a:endParaRPr lang="en-GB" sz="1200" dirty="0" smtClean="0"/>
+              <a:t>Matching representative spectra with lists of interesting molecules and databases</a:t>
+            </a:r>
           </a:p>
         </p:txBody>
       </p:sp>
@@ -4271,7 +4383,7 @@
           <p:cNvPr id="25" name="Straight Arrow Connector 24">
             <a:extLst>
               <a:ext uri="{FF2B5EF4-FFF2-40B4-BE49-F238E27FC236}">
-                <a16:creationId xmlns:a16="http://schemas.microsoft.com/office/drawing/2014/main" xmlns="" id="{4FE9E570-253C-4922-BA49-B370F36F4CAA}"/>
+                <a16:creationId xmlns="" xmlns:a16="http://schemas.microsoft.com/office/drawing/2014/main" id="{4FE9E570-253C-4922-BA49-B370F36F4CAA}"/>
               </a:ext>
             </a:extLst>
           </p:cNvPr>
@@ -4315,7 +4427,7 @@
           <p:cNvPr id="26" name="Rectangle 25">
             <a:extLst>
               <a:ext uri="{FF2B5EF4-FFF2-40B4-BE49-F238E27FC236}">
-                <a16:creationId xmlns:a16="http://schemas.microsoft.com/office/drawing/2014/main" xmlns="" id="{FBD453A1-A3AF-40EE-837B-2CADAC3A6221}"/>
+                <a16:creationId xmlns="" xmlns:a16="http://schemas.microsoft.com/office/drawing/2014/main" id="{FBD453A1-A3AF-40EE-837B-2CADAC3A6221}"/>
               </a:ext>
             </a:extLst>
           </p:cNvPr>
@@ -4377,7 +4489,7 @@
           <p:cNvPr id="27" name="Rectangle 26">
             <a:extLst>
               <a:ext uri="{FF2B5EF4-FFF2-40B4-BE49-F238E27FC236}">
-                <a16:creationId xmlns:a16="http://schemas.microsoft.com/office/drawing/2014/main" xmlns="" id="{FBD453A1-A3AF-40EE-837B-2CADAC3A6221}"/>
+                <a16:creationId xmlns="" xmlns:a16="http://schemas.microsoft.com/office/drawing/2014/main" id="{FBD453A1-A3AF-40EE-837B-2CADAC3A6221}"/>
               </a:ext>
             </a:extLst>
           </p:cNvPr>
@@ -4439,7 +4551,7 @@
           <p:cNvPr id="28" name="Rectangle 27">
             <a:extLst>
               <a:ext uri="{FF2B5EF4-FFF2-40B4-BE49-F238E27FC236}">
-                <a16:creationId xmlns:a16="http://schemas.microsoft.com/office/drawing/2014/main" xmlns="" id="{FBD453A1-A3AF-40EE-837B-2CADAC3A6221}"/>
+                <a16:creationId xmlns="" xmlns:a16="http://schemas.microsoft.com/office/drawing/2014/main" id="{FBD453A1-A3AF-40EE-837B-2CADAC3A6221}"/>
               </a:ext>
             </a:extLst>
           </p:cNvPr>
@@ -4493,7 +4605,7 @@
           <p:cNvPr id="30" name="Rectangle 29">
             <a:extLst>
               <a:ext uri="{FF2B5EF4-FFF2-40B4-BE49-F238E27FC236}">
-                <a16:creationId xmlns:a16="http://schemas.microsoft.com/office/drawing/2014/main" xmlns="" id="{FBD453A1-A3AF-40EE-837B-2CADAC3A6221}"/>
+                <a16:creationId xmlns="" xmlns:a16="http://schemas.microsoft.com/office/drawing/2014/main" id="{FBD453A1-A3AF-40EE-837B-2CADAC3A6221}"/>
               </a:ext>
             </a:extLst>
           </p:cNvPr>
@@ -4609,7 +4721,7 @@
         </p:nvSpPr>
         <p:spPr>
           <a:xfrm>
-            <a:off x="1577050" y="450356"/>
+            <a:off x="1569235" y="450356"/>
             <a:ext cx="228729" cy="153888"/>
           </a:xfrm>
           <a:prstGeom prst="rect">
@@ -5004,7 +5116,7 @@
           <p:cNvPr id="40" name="Rectangle 39">
             <a:extLst>
               <a:ext uri="{FF2B5EF4-FFF2-40B4-BE49-F238E27FC236}">
-                <a16:creationId xmlns:a16="http://schemas.microsoft.com/office/drawing/2014/main" xmlns="" id="{CEF11C59-0A30-413B-A138-5882976AD0E8}"/>
+                <a16:creationId xmlns="" xmlns:a16="http://schemas.microsoft.com/office/drawing/2014/main" id="{CEF11C59-0A30-413B-A138-5882976AD0E8}"/>
               </a:ext>
             </a:extLst>
           </p:cNvPr>
@@ -5061,7 +5173,67 @@
                   </a:schemeClr>
                 </a:solidFill>
               </a:rPr>
-              <a:t>Here you have to say which folders of data you would like to process, which files within these folders, which main masks, which normalisations.</a:t>
+              <a:t>With information regarding which </a:t>
+            </a:r>
+            <a:r>
+              <a:rPr lang="en-GB" sz="700" dirty="0" smtClean="0">
+                <a:solidFill>
+                  <a:schemeClr val="accent3">
+                    <a:lumMod val="50000"/>
+                  </a:schemeClr>
+                </a:solidFill>
+              </a:rPr>
+              <a:t>folders of data </a:t>
+            </a:r>
+            <a:r>
+              <a:rPr lang="en-GB" sz="700" dirty="0" smtClean="0">
+                <a:solidFill>
+                  <a:schemeClr val="accent3">
+                    <a:lumMod val="50000"/>
+                  </a:schemeClr>
+                </a:solidFill>
+              </a:rPr>
+              <a:t>need to be processed, </a:t>
+            </a:r>
+            <a:r>
+              <a:rPr lang="en-GB" sz="700" dirty="0" smtClean="0">
+                <a:solidFill>
+                  <a:schemeClr val="accent3">
+                    <a:lumMod val="50000"/>
+                  </a:schemeClr>
+                </a:solidFill>
+              </a:rPr>
+              <a:t>which files within these folders, which main </a:t>
+            </a:r>
+            <a:r>
+              <a:rPr lang="en-GB" sz="700" dirty="0" smtClean="0">
+                <a:solidFill>
+                  <a:schemeClr val="accent3">
+                    <a:lumMod val="50000"/>
+                  </a:schemeClr>
+                </a:solidFill>
+              </a:rPr>
+              <a:t>masks to use, </a:t>
+            </a:r>
+            <a:r>
+              <a:rPr lang="en-GB" sz="700" dirty="0" smtClean="0">
+                <a:solidFill>
+                  <a:schemeClr val="accent3">
+                    <a:lumMod val="50000"/>
+                  </a:schemeClr>
+                </a:solidFill>
+              </a:rPr>
+              <a:t>which </a:t>
+            </a:r>
+            <a:r>
+              <a:rPr lang="en-GB" sz="700" dirty="0" smtClean="0">
+                <a:solidFill>
+                  <a:schemeClr val="accent3">
+                    <a:lumMod val="50000"/>
+                  </a:schemeClr>
+                </a:solidFill>
+              </a:rPr>
+              <a:t>normalisations to save.</a:t>
             </a:r>
             <a:endParaRPr lang="en-GB" sz="700" dirty="0">
               <a:solidFill>
@@ -5078,7 +5250,7 @@
           <p:cNvPr id="41" name="Rectangle 40">
             <a:extLst>
               <a:ext uri="{FF2B5EF4-FFF2-40B4-BE49-F238E27FC236}">
-                <a16:creationId xmlns:a16="http://schemas.microsoft.com/office/drawing/2014/main" xmlns="" id="{CEF11C59-0A30-413B-A138-5882976AD0E8}"/>
+                <a16:creationId xmlns="" xmlns:a16="http://schemas.microsoft.com/office/drawing/2014/main" id="{CEF11C59-0A30-413B-A138-5882976AD0E8}"/>
               </a:ext>
             </a:extLst>
           </p:cNvPr>
@@ -5087,8 +5259,8 @@
         </p:nvSpPr>
         <p:spPr>
           <a:xfrm>
-            <a:off x="1584284" y="3243151"/>
-            <a:ext cx="947422" cy="781396"/>
+            <a:off x="1584283" y="3243151"/>
+            <a:ext cx="1079999" cy="781396"/>
           </a:xfrm>
           <a:prstGeom prst="rect">
             <a:avLst/>
@@ -5144,7 +5316,7 @@
         </p:nvSpPr>
         <p:spPr>
           <a:xfrm>
-            <a:off x="1583351" y="3222570"/>
+            <a:off x="1567721" y="3222570"/>
             <a:ext cx="222428" cy="153888"/>
           </a:xfrm>
           <a:prstGeom prst="rect">
@@ -5184,7 +5356,7 @@
           <p:cNvPr id="43" name="Rectangle 42">
             <a:extLst>
               <a:ext uri="{FF2B5EF4-FFF2-40B4-BE49-F238E27FC236}">
-                <a16:creationId xmlns:a16="http://schemas.microsoft.com/office/drawing/2014/main" xmlns="" id="{FBD453A1-A3AF-40EE-837B-2CADAC3A6221}"/>
+                <a16:creationId xmlns="" xmlns:a16="http://schemas.microsoft.com/office/drawing/2014/main" id="{FBD453A1-A3AF-40EE-837B-2CADAC3A6221}"/>
               </a:ext>
             </a:extLst>
           </p:cNvPr>
@@ -5295,7 +5467,7 @@
           <p:cNvPr id="49" name="Rectangle 48">
             <a:extLst>
               <a:ext uri="{FF2B5EF4-FFF2-40B4-BE49-F238E27FC236}">
-                <a16:creationId xmlns:a16="http://schemas.microsoft.com/office/drawing/2014/main" xmlns="" id="{FBD453A1-A3AF-40EE-837B-2CADAC3A6221}"/>
+                <a16:creationId xmlns="" xmlns:a16="http://schemas.microsoft.com/office/drawing/2014/main" id="{FBD453A1-A3AF-40EE-837B-2CADAC3A6221}"/>
               </a:ext>
             </a:extLst>
           </p:cNvPr>
@@ -5407,7 +5579,7 @@
           <p:cNvPr id="53" name="Rectangle 52">
             <a:extLst>
               <a:ext uri="{FF2B5EF4-FFF2-40B4-BE49-F238E27FC236}">
-                <a16:creationId xmlns:a16="http://schemas.microsoft.com/office/drawing/2014/main" xmlns="" id="{FBD453A1-A3AF-40EE-837B-2CADAC3A6221}"/>
+                <a16:creationId xmlns="" xmlns:a16="http://schemas.microsoft.com/office/drawing/2014/main" id="{FBD453A1-A3AF-40EE-837B-2CADAC3A6221}"/>
               </a:ext>
             </a:extLst>
           </p:cNvPr>
@@ -5480,7 +5652,7 @@
           <p:cNvPr id="55" name="Rectangle 54">
             <a:extLst>
               <a:ext uri="{FF2B5EF4-FFF2-40B4-BE49-F238E27FC236}">
-                <a16:creationId xmlns:a16="http://schemas.microsoft.com/office/drawing/2014/main" xmlns="" id="{FBD453A1-A3AF-40EE-837B-2CADAC3A6221}"/>
+                <a16:creationId xmlns="" xmlns:a16="http://schemas.microsoft.com/office/drawing/2014/main" id="{FBD453A1-A3AF-40EE-837B-2CADAC3A6221}"/>
               </a:ext>
             </a:extLst>
           </p:cNvPr>
@@ -5543,7 +5715,7 @@
           <p:cNvPr id="59" name="Rectangle 58">
             <a:extLst>
               <a:ext uri="{FF2B5EF4-FFF2-40B4-BE49-F238E27FC236}">
-                <a16:creationId xmlns:a16="http://schemas.microsoft.com/office/drawing/2014/main" xmlns="" id="{FBD453A1-A3AF-40EE-837B-2CADAC3A6221}"/>
+                <a16:creationId xmlns="" xmlns:a16="http://schemas.microsoft.com/office/drawing/2014/main" id="{FBD453A1-A3AF-40EE-837B-2CADAC3A6221}"/>
               </a:ext>
             </a:extLst>
           </p:cNvPr>
@@ -5613,7 +5785,7 @@
           <p:cNvPr id="60" name="Rectangle 59">
             <a:extLst>
               <a:ext uri="{FF2B5EF4-FFF2-40B4-BE49-F238E27FC236}">
-                <a16:creationId xmlns:a16="http://schemas.microsoft.com/office/drawing/2014/main" xmlns="" id="{FBD453A1-A3AF-40EE-837B-2CADAC3A6221}"/>
+                <a16:creationId xmlns="" xmlns:a16="http://schemas.microsoft.com/office/drawing/2014/main" id="{FBD453A1-A3AF-40EE-837B-2CADAC3A6221}"/>
               </a:ext>
             </a:extLst>
           </p:cNvPr>
@@ -5668,7 +5840,7 @@
           <p:cNvPr id="68" name="Straight Arrow Connector 67">
             <a:extLst>
               <a:ext uri="{FF2B5EF4-FFF2-40B4-BE49-F238E27FC236}">
-                <a16:creationId xmlns:a16="http://schemas.microsoft.com/office/drawing/2014/main" xmlns="" id="{4FE9E570-253C-4922-BA49-B370F36F4CAA}"/>
+                <a16:creationId xmlns="" xmlns:a16="http://schemas.microsoft.com/office/drawing/2014/main" id="{4FE9E570-253C-4922-BA49-B370F36F4CAA}"/>
               </a:ext>
             </a:extLst>
           </p:cNvPr>
@@ -5712,7 +5884,7 @@
           <p:cNvPr id="69" name="Straight Arrow Connector 68">
             <a:extLst>
               <a:ext uri="{FF2B5EF4-FFF2-40B4-BE49-F238E27FC236}">
-                <a16:creationId xmlns:a16="http://schemas.microsoft.com/office/drawing/2014/main" xmlns="" id="{4FE9E570-253C-4922-BA49-B370F36F4CAA}"/>
+                <a16:creationId xmlns="" xmlns:a16="http://schemas.microsoft.com/office/drawing/2014/main" id="{4FE9E570-253C-4922-BA49-B370F36F4CAA}"/>
               </a:ext>
             </a:extLst>
           </p:cNvPr>
@@ -5756,7 +5928,7 @@
           <p:cNvPr id="81" name="Straight Arrow Connector 80">
             <a:extLst>
               <a:ext uri="{FF2B5EF4-FFF2-40B4-BE49-F238E27FC236}">
-                <a16:creationId xmlns:a16="http://schemas.microsoft.com/office/drawing/2014/main" xmlns="" id="{4FE9E570-253C-4922-BA49-B370F36F4CAA}"/>
+                <a16:creationId xmlns="" xmlns:a16="http://schemas.microsoft.com/office/drawing/2014/main" id="{4FE9E570-253C-4922-BA49-B370F36F4CAA}"/>
               </a:ext>
             </a:extLst>
           </p:cNvPr>
@@ -5843,7 +6015,7 @@
           <p:cNvPr id="84" name="Straight Arrow Connector 83">
             <a:extLst>
               <a:ext uri="{FF2B5EF4-FFF2-40B4-BE49-F238E27FC236}">
-                <a16:creationId xmlns:a16="http://schemas.microsoft.com/office/drawing/2014/main" xmlns="" id="{4FE9E570-253C-4922-BA49-B370F36F4CAA}"/>
+                <a16:creationId xmlns="" xmlns:a16="http://schemas.microsoft.com/office/drawing/2014/main" id="{4FE9E570-253C-4922-BA49-B370F36F4CAA}"/>
               </a:ext>
             </a:extLst>
           </p:cNvPr>
@@ -5927,7 +6099,7 @@
           <p:cNvPr id="120" name="Rectangle 119">
             <a:extLst>
               <a:ext uri="{FF2B5EF4-FFF2-40B4-BE49-F238E27FC236}">
-                <a16:creationId xmlns:a16="http://schemas.microsoft.com/office/drawing/2014/main" xmlns="" id="{FBD453A1-A3AF-40EE-837B-2CADAC3A6221}"/>
+                <a16:creationId xmlns="" xmlns:a16="http://schemas.microsoft.com/office/drawing/2014/main" id="{FBD453A1-A3AF-40EE-837B-2CADAC3A6221}"/>
               </a:ext>
             </a:extLst>
           </p:cNvPr>
@@ -5994,7 +6166,7 @@
           <p:cNvPr id="121" name="Rectangle 120">
             <a:extLst>
               <a:ext uri="{FF2B5EF4-FFF2-40B4-BE49-F238E27FC236}">
-                <a16:creationId xmlns:a16="http://schemas.microsoft.com/office/drawing/2014/main" xmlns="" id="{FBD453A1-A3AF-40EE-837B-2CADAC3A6221}"/>
+                <a16:creationId xmlns="" xmlns:a16="http://schemas.microsoft.com/office/drawing/2014/main" id="{FBD453A1-A3AF-40EE-837B-2CADAC3A6221}"/>
               </a:ext>
             </a:extLst>
           </p:cNvPr>
@@ -6064,7 +6236,7 @@
           <p:cNvPr id="122" name="Rectangle 121">
             <a:extLst>
               <a:ext uri="{FF2B5EF4-FFF2-40B4-BE49-F238E27FC236}">
-                <a16:creationId xmlns:a16="http://schemas.microsoft.com/office/drawing/2014/main" xmlns="" id="{FBD453A1-A3AF-40EE-837B-2CADAC3A6221}"/>
+                <a16:creationId xmlns="" xmlns:a16="http://schemas.microsoft.com/office/drawing/2014/main" id="{FBD453A1-A3AF-40EE-837B-2CADAC3A6221}"/>
               </a:ext>
             </a:extLst>
           </p:cNvPr>
@@ -6131,7 +6303,7 @@
           <p:cNvPr id="123" name="Rectangle 122">
             <a:extLst>
               <a:ext uri="{FF2B5EF4-FFF2-40B4-BE49-F238E27FC236}">
-                <a16:creationId xmlns:a16="http://schemas.microsoft.com/office/drawing/2014/main" xmlns="" id="{FBD453A1-A3AF-40EE-837B-2CADAC3A6221}"/>
+                <a16:creationId xmlns="" xmlns:a16="http://schemas.microsoft.com/office/drawing/2014/main" id="{FBD453A1-A3AF-40EE-837B-2CADAC3A6221}"/>
               </a:ext>
             </a:extLst>
           </p:cNvPr>
@@ -6198,7 +6370,7 @@
           <p:cNvPr id="124" name="Rectangle 123">
             <a:extLst>
               <a:ext uri="{FF2B5EF4-FFF2-40B4-BE49-F238E27FC236}">
-                <a16:creationId xmlns:a16="http://schemas.microsoft.com/office/drawing/2014/main" xmlns="" id="{FBD453A1-A3AF-40EE-837B-2CADAC3A6221}"/>
+                <a16:creationId xmlns="" xmlns:a16="http://schemas.microsoft.com/office/drawing/2014/main" id="{FBD453A1-A3AF-40EE-837B-2CADAC3A6221}"/>
               </a:ext>
             </a:extLst>
           </p:cNvPr>
@@ -6278,7 +6450,7 @@
           <p:cNvPr id="171" name="Straight Arrow Connector 170">
             <a:extLst>
               <a:ext uri="{FF2B5EF4-FFF2-40B4-BE49-F238E27FC236}">
-                <a16:creationId xmlns:a16="http://schemas.microsoft.com/office/drawing/2014/main" xmlns="" id="{4FE9E570-253C-4922-BA49-B370F36F4CAA}"/>
+                <a16:creationId xmlns="" xmlns:a16="http://schemas.microsoft.com/office/drawing/2014/main" id="{4FE9E570-253C-4922-BA49-B370F36F4CAA}"/>
               </a:ext>
             </a:extLst>
           </p:cNvPr>
@@ -6459,7 +6631,7 @@
           <p:cNvPr id="176" name="Rectangle 175">
             <a:extLst>
               <a:ext uri="{FF2B5EF4-FFF2-40B4-BE49-F238E27FC236}">
-                <a16:creationId xmlns:a16="http://schemas.microsoft.com/office/drawing/2014/main" xmlns="" id="{FBD453A1-A3AF-40EE-837B-2CADAC3A6221}"/>
+                <a16:creationId xmlns="" xmlns:a16="http://schemas.microsoft.com/office/drawing/2014/main" id="{FBD453A1-A3AF-40EE-837B-2CADAC3A6221}"/>
               </a:ext>
             </a:extLst>
           </p:cNvPr>
@@ -6517,7 +6689,7 @@
           <p:cNvPr id="177" name="Rectangle 176">
             <a:extLst>
               <a:ext uri="{FF2B5EF4-FFF2-40B4-BE49-F238E27FC236}">
-                <a16:creationId xmlns:a16="http://schemas.microsoft.com/office/drawing/2014/main" xmlns="" id="{FBD453A1-A3AF-40EE-837B-2CADAC3A6221}"/>
+                <a16:creationId xmlns="" xmlns:a16="http://schemas.microsoft.com/office/drawing/2014/main" id="{FBD453A1-A3AF-40EE-837B-2CADAC3A6221}"/>
               </a:ext>
             </a:extLst>
           </p:cNvPr>
@@ -6584,7 +6756,7 @@
           <p:cNvPr id="178" name="Rectangle 177">
             <a:extLst>
               <a:ext uri="{FF2B5EF4-FFF2-40B4-BE49-F238E27FC236}">
-                <a16:creationId xmlns:a16="http://schemas.microsoft.com/office/drawing/2014/main" xmlns="" id="{FBD453A1-A3AF-40EE-837B-2CADAC3A6221}"/>
+                <a16:creationId xmlns="" xmlns:a16="http://schemas.microsoft.com/office/drawing/2014/main" id="{FBD453A1-A3AF-40EE-837B-2CADAC3A6221}"/>
               </a:ext>
             </a:extLst>
           </p:cNvPr>
@@ -6638,7 +6810,7 @@
           <p:cNvPr id="179" name="Rectangle 178">
             <a:extLst>
               <a:ext uri="{FF2B5EF4-FFF2-40B4-BE49-F238E27FC236}">
-                <a16:creationId xmlns:a16="http://schemas.microsoft.com/office/drawing/2014/main" xmlns="" id="{FBD453A1-A3AF-40EE-837B-2CADAC3A6221}"/>
+                <a16:creationId xmlns="" xmlns:a16="http://schemas.microsoft.com/office/drawing/2014/main" id="{FBD453A1-A3AF-40EE-837B-2CADAC3A6221}"/>
               </a:ext>
             </a:extLst>
           </p:cNvPr>
@@ -6705,7 +6877,7 @@
           <p:cNvPr id="180" name="Rectangle 179">
             <a:extLst>
               <a:ext uri="{FF2B5EF4-FFF2-40B4-BE49-F238E27FC236}">
-                <a16:creationId xmlns:a16="http://schemas.microsoft.com/office/drawing/2014/main" xmlns="" id="{FBD453A1-A3AF-40EE-837B-2CADAC3A6221}"/>
+                <a16:creationId xmlns="" xmlns:a16="http://schemas.microsoft.com/office/drawing/2014/main" id="{FBD453A1-A3AF-40EE-837B-2CADAC3A6221}"/>
               </a:ext>
             </a:extLst>
           </p:cNvPr>
@@ -6760,7 +6932,7 @@
           <p:cNvPr id="181" name="Rectangle 180">
             <a:extLst>
               <a:ext uri="{FF2B5EF4-FFF2-40B4-BE49-F238E27FC236}">
-                <a16:creationId xmlns:a16="http://schemas.microsoft.com/office/drawing/2014/main" xmlns="" id="{FBD453A1-A3AF-40EE-837B-2CADAC3A6221}"/>
+                <a16:creationId xmlns="" xmlns:a16="http://schemas.microsoft.com/office/drawing/2014/main" id="{FBD453A1-A3AF-40EE-837B-2CADAC3A6221}"/>
               </a:ext>
             </a:extLst>
           </p:cNvPr>
@@ -6906,7 +7078,7 @@
           <p:cNvPr id="184" name="Straight Arrow Connector 183">
             <a:extLst>
               <a:ext uri="{FF2B5EF4-FFF2-40B4-BE49-F238E27FC236}">
-                <a16:creationId xmlns:a16="http://schemas.microsoft.com/office/drawing/2014/main" xmlns="" id="{4FE9E570-253C-4922-BA49-B370F36F4CAA}"/>
+                <a16:creationId xmlns="" xmlns:a16="http://schemas.microsoft.com/office/drawing/2014/main" id="{4FE9E570-253C-4922-BA49-B370F36F4CAA}"/>
               </a:ext>
             </a:extLst>
           </p:cNvPr>
@@ -6950,7 +7122,7 @@
           <p:cNvPr id="196" name="Rectangle 195">
             <a:extLst>
               <a:ext uri="{FF2B5EF4-FFF2-40B4-BE49-F238E27FC236}">
-                <a16:creationId xmlns:a16="http://schemas.microsoft.com/office/drawing/2014/main" xmlns="" id="{FBD453A1-A3AF-40EE-837B-2CADAC3A6221}"/>
+                <a16:creationId xmlns="" xmlns:a16="http://schemas.microsoft.com/office/drawing/2014/main" id="{FBD453A1-A3AF-40EE-837B-2CADAC3A6221}"/>
               </a:ext>
             </a:extLst>
           </p:cNvPr>
@@ -7048,7 +7220,7 @@
           <p:cNvPr id="206" name="Straight Arrow Connector 205">
             <a:extLst>
               <a:ext uri="{FF2B5EF4-FFF2-40B4-BE49-F238E27FC236}">
-                <a16:creationId xmlns:a16="http://schemas.microsoft.com/office/drawing/2014/main" xmlns="" id="{4FE9E570-253C-4922-BA49-B370F36F4CAA}"/>
+                <a16:creationId xmlns="" xmlns:a16="http://schemas.microsoft.com/office/drawing/2014/main" id="{4FE9E570-253C-4922-BA49-B370F36F4CAA}"/>
               </a:ext>
             </a:extLst>
           </p:cNvPr>
@@ -7087,6 +7259,80 @@
           </a:fontRef>
         </p:style>
       </p:cxnSp>
+      <p:sp>
+        <p:nvSpPr>
+          <p:cNvPr id="67" name="Rectangle 66">
+            <a:extLst>
+              <a:ext uri="{FF2B5EF4-FFF2-40B4-BE49-F238E27FC236}">
+                <a16:creationId xmlns="" xmlns:a16="http://schemas.microsoft.com/office/drawing/2014/main" id="{CEF11C59-0A30-413B-A138-5882976AD0E8}"/>
+              </a:ext>
+            </a:extLst>
+          </p:cNvPr>
+          <p:cNvSpPr/>
+          <p:nvPr/>
+        </p:nvSpPr>
+        <p:spPr>
+          <a:xfrm>
+            <a:off x="250564" y="2417228"/>
+            <a:ext cx="1296786" cy="781396"/>
+          </a:xfrm>
+          <a:prstGeom prst="rect">
+            <a:avLst/>
+          </a:prstGeom>
+          <a:solidFill>
+            <a:schemeClr val="bg1">
+              <a:lumMod val="95000"/>
+            </a:schemeClr>
+          </a:solidFill>
+          <a:ln>
+            <a:solidFill>
+              <a:schemeClr val="bg2">
+                <a:lumMod val="50000"/>
+              </a:schemeClr>
+            </a:solidFill>
+          </a:ln>
+        </p:spPr>
+        <p:style>
+          <a:lnRef idx="2">
+            <a:schemeClr val="accent1">
+              <a:shade val="50000"/>
+            </a:schemeClr>
+          </a:lnRef>
+          <a:fillRef idx="1">
+            <a:schemeClr val="accent1"/>
+          </a:fillRef>
+          <a:effectRef idx="0">
+            <a:schemeClr val="accent1"/>
+          </a:effectRef>
+          <a:fontRef idx="minor">
+            <a:schemeClr val="lt1"/>
+          </a:fontRef>
+        </p:style>
+        <p:txBody>
+          <a:bodyPr rtlCol="0" anchor="ctr"/>
+          <a:lstStyle/>
+          <a:p>
+            <a:pPr algn="ctr"/>
+            <a:r>
+              <a:rPr lang="en-GB" sz="700" dirty="0" smtClean="0">
+                <a:solidFill>
+                  <a:schemeClr val="accent3">
+                    <a:lumMod val="50000"/>
+                  </a:schemeClr>
+                </a:solidFill>
+              </a:rPr>
+              <a:t>It is recommended to have a master script for each study, as information regarding data location needs to be specified in it.</a:t>
+            </a:r>
+            <a:endParaRPr lang="en-GB" sz="700" dirty="0">
+              <a:solidFill>
+                <a:schemeClr val="accent3">
+                  <a:lumMod val="50000"/>
+                </a:schemeClr>
+              </a:solidFill>
+            </a:endParaRPr>
+          </a:p>
+        </p:txBody>
+      </p:sp>
     </p:spTree>
     <p:extLst>
       <p:ext uri="{BB962C8B-B14F-4D97-AF65-F5344CB8AC3E}">
@@ -7122,7 +7368,7 @@
           <p:cNvPr id="129" name="Straight Arrow Connector 128">
             <a:extLst>
               <a:ext uri="{FF2B5EF4-FFF2-40B4-BE49-F238E27FC236}">
-                <a16:creationId xmlns:a16="http://schemas.microsoft.com/office/drawing/2014/main" xmlns="" id="{4FE9E570-253C-4922-BA49-B370F36F4CAA}"/>
+                <a16:creationId xmlns="" xmlns:a16="http://schemas.microsoft.com/office/drawing/2014/main" id="{4FE9E570-253C-4922-BA49-B370F36F4CAA}"/>
               </a:ext>
             </a:extLst>
           </p:cNvPr>
@@ -7167,7 +7413,7 @@
           <p:cNvPr id="5" name="Rectangle 4">
             <a:extLst>
               <a:ext uri="{FF2B5EF4-FFF2-40B4-BE49-F238E27FC236}">
-                <a16:creationId xmlns:a16="http://schemas.microsoft.com/office/drawing/2014/main" xmlns="" id="{FBD453A1-A3AF-40EE-837B-2CADAC3A6221}"/>
+                <a16:creationId xmlns="" xmlns:a16="http://schemas.microsoft.com/office/drawing/2014/main" id="{FBD453A1-A3AF-40EE-837B-2CADAC3A6221}"/>
               </a:ext>
             </a:extLst>
           </p:cNvPr>
@@ -7323,7 +7569,7 @@
           <p:cNvPr id="10" name="Rectangle 9">
             <a:extLst>
               <a:ext uri="{FF2B5EF4-FFF2-40B4-BE49-F238E27FC236}">
-                <a16:creationId xmlns:a16="http://schemas.microsoft.com/office/drawing/2014/main" xmlns="" id="{6B8F8C16-8BF5-44CE-A165-28895472E11E}"/>
+                <a16:creationId xmlns="" xmlns:a16="http://schemas.microsoft.com/office/drawing/2014/main" id="{6B8F8C16-8BF5-44CE-A165-28895472E11E}"/>
               </a:ext>
             </a:extLst>
           </p:cNvPr>
@@ -7393,7 +7639,7 @@
           <p:cNvPr id="176" name="Rectangle 175">
             <a:extLst>
               <a:ext uri="{FF2B5EF4-FFF2-40B4-BE49-F238E27FC236}">
-                <a16:creationId xmlns:a16="http://schemas.microsoft.com/office/drawing/2014/main" xmlns="" id="{FBD453A1-A3AF-40EE-837B-2CADAC3A6221}"/>
+                <a16:creationId xmlns="" xmlns:a16="http://schemas.microsoft.com/office/drawing/2014/main" id="{FBD453A1-A3AF-40EE-837B-2CADAC3A6221}"/>
               </a:ext>
             </a:extLst>
           </p:cNvPr>
@@ -7512,7 +7758,7 @@
           <p:cNvPr id="74" name="Rectangle 73">
             <a:extLst>
               <a:ext uri="{FF2B5EF4-FFF2-40B4-BE49-F238E27FC236}">
-                <a16:creationId xmlns:a16="http://schemas.microsoft.com/office/drawing/2014/main" xmlns="" id="{6B8F8C16-8BF5-44CE-A165-28895472E11E}"/>
+                <a16:creationId xmlns="" xmlns:a16="http://schemas.microsoft.com/office/drawing/2014/main" id="{6B8F8C16-8BF5-44CE-A165-28895472E11E}"/>
               </a:ext>
             </a:extLst>
           </p:cNvPr>
@@ -7578,7 +7824,7 @@
           <p:cNvPr id="76" name="Rectangle 75">
             <a:extLst>
               <a:ext uri="{FF2B5EF4-FFF2-40B4-BE49-F238E27FC236}">
-                <a16:creationId xmlns:a16="http://schemas.microsoft.com/office/drawing/2014/main" xmlns="" id="{FBD453A1-A3AF-40EE-837B-2CADAC3A6221}"/>
+                <a16:creationId xmlns="" xmlns:a16="http://schemas.microsoft.com/office/drawing/2014/main" id="{FBD453A1-A3AF-40EE-837B-2CADAC3A6221}"/>
               </a:ext>
             </a:extLst>
           </p:cNvPr>
@@ -7709,7 +7955,7 @@
           <p:cNvPr id="77" name="Rectangle 76">
             <a:extLst>
               <a:ext uri="{FF2B5EF4-FFF2-40B4-BE49-F238E27FC236}">
-                <a16:creationId xmlns:a16="http://schemas.microsoft.com/office/drawing/2014/main" xmlns="" id="{6B8F8C16-8BF5-44CE-A165-28895472E11E}"/>
+                <a16:creationId xmlns="" xmlns:a16="http://schemas.microsoft.com/office/drawing/2014/main" id="{6B8F8C16-8BF5-44CE-A165-28895472E11E}"/>
               </a:ext>
             </a:extLst>
           </p:cNvPr>
@@ -7768,7 +8014,7 @@
           <p:cNvPr id="79" name="Rectangle 78">
             <a:extLst>
               <a:ext uri="{FF2B5EF4-FFF2-40B4-BE49-F238E27FC236}">
-                <a16:creationId xmlns:a16="http://schemas.microsoft.com/office/drawing/2014/main" xmlns="" id="{FBD453A1-A3AF-40EE-837B-2CADAC3A6221}"/>
+                <a16:creationId xmlns="" xmlns:a16="http://schemas.microsoft.com/office/drawing/2014/main" id="{FBD453A1-A3AF-40EE-837B-2CADAC3A6221}"/>
               </a:ext>
             </a:extLst>
           </p:cNvPr>
@@ -7957,7 +8203,7 @@
           <p:cNvPr id="85" name="Rectangle 84">
             <a:extLst>
               <a:ext uri="{FF2B5EF4-FFF2-40B4-BE49-F238E27FC236}">
-                <a16:creationId xmlns:a16="http://schemas.microsoft.com/office/drawing/2014/main" xmlns="" id="{6B8F8C16-8BF5-44CE-A165-28895472E11E}"/>
+                <a16:creationId xmlns="" xmlns:a16="http://schemas.microsoft.com/office/drawing/2014/main" id="{6B8F8C16-8BF5-44CE-A165-28895472E11E}"/>
               </a:ext>
             </a:extLst>
           </p:cNvPr>
@@ -8016,7 +8262,7 @@
           <p:cNvPr id="87" name="Rectangle 86">
             <a:extLst>
               <a:ext uri="{FF2B5EF4-FFF2-40B4-BE49-F238E27FC236}">
-                <a16:creationId xmlns:a16="http://schemas.microsoft.com/office/drawing/2014/main" xmlns="" id="{6B8F8C16-8BF5-44CE-A165-28895472E11E}"/>
+                <a16:creationId xmlns="" xmlns:a16="http://schemas.microsoft.com/office/drawing/2014/main" id="{6B8F8C16-8BF5-44CE-A165-28895472E11E}"/>
               </a:ext>
             </a:extLst>
           </p:cNvPr>
@@ -8075,7 +8321,7 @@
           <p:cNvPr id="89" name="Rectangle 88">
             <a:extLst>
               <a:ext uri="{FF2B5EF4-FFF2-40B4-BE49-F238E27FC236}">
-                <a16:creationId xmlns:a16="http://schemas.microsoft.com/office/drawing/2014/main" xmlns="" id="{FBD453A1-A3AF-40EE-837B-2CADAC3A6221}"/>
+                <a16:creationId xmlns="" xmlns:a16="http://schemas.microsoft.com/office/drawing/2014/main" id="{FBD453A1-A3AF-40EE-837B-2CADAC3A6221}"/>
               </a:ext>
             </a:extLst>
           </p:cNvPr>
@@ -8206,7 +8452,7 @@
           <p:cNvPr id="91" name="Rectangle 90">
             <a:extLst>
               <a:ext uri="{FF2B5EF4-FFF2-40B4-BE49-F238E27FC236}">
-                <a16:creationId xmlns:a16="http://schemas.microsoft.com/office/drawing/2014/main" xmlns="" id="{FBD453A1-A3AF-40EE-837B-2CADAC3A6221}"/>
+                <a16:creationId xmlns="" xmlns:a16="http://schemas.microsoft.com/office/drawing/2014/main" id="{FBD453A1-A3AF-40EE-837B-2CADAC3A6221}"/>
               </a:ext>
             </a:extLst>
           </p:cNvPr>
@@ -8340,7 +8586,7 @@
           <p:cNvPr id="92" name="Rectangle 91">
             <a:extLst>
               <a:ext uri="{FF2B5EF4-FFF2-40B4-BE49-F238E27FC236}">
-                <a16:creationId xmlns:a16="http://schemas.microsoft.com/office/drawing/2014/main" xmlns="" id="{FBD453A1-A3AF-40EE-837B-2CADAC3A6221}"/>
+                <a16:creationId xmlns="" xmlns:a16="http://schemas.microsoft.com/office/drawing/2014/main" id="{FBD453A1-A3AF-40EE-837B-2CADAC3A6221}"/>
               </a:ext>
             </a:extLst>
           </p:cNvPr>
@@ -8400,7 +8646,7 @@
                   <a:schemeClr val="bg1"/>
                 </a:solidFill>
               </a:rPr>
-              <a:t> of files of interest - pixels of interest mask </a:t>
+              <a:t> of files of interest - </a:t>
             </a:r>
             <a:r>
               <a:rPr lang="en-GB" sz="700" dirty="0" smtClean="0">
@@ -8408,7 +8654,15 @@
                   <a:schemeClr val="bg1"/>
                 </a:solidFill>
               </a:rPr>
-              <a:t>- path to the </a:t>
+              <a:t>path </a:t>
+            </a:r>
+            <a:r>
+              <a:rPr lang="en-GB" sz="700" dirty="0" smtClean="0">
+                <a:solidFill>
+                  <a:schemeClr val="bg1"/>
+                </a:solidFill>
+              </a:rPr>
+              <a:t>to the </a:t>
             </a:r>
             <a:r>
               <a:rPr lang="en-GB" sz="700" dirty="0" err="1" smtClean="0">
@@ -8424,7 +8678,15 @@
                   <a:schemeClr val="bg1"/>
                 </a:solidFill>
               </a:rPr>
-              <a:t> file for pre-processing - mask of pixels of interest - path to the folder where all results will be saved</a:t>
+              <a:t> file for </a:t>
+            </a:r>
+            <a:r>
+              <a:rPr lang="en-GB" sz="700" dirty="0" smtClean="0">
+                <a:solidFill>
+                  <a:schemeClr val="bg1"/>
+                </a:solidFill>
+              </a:rPr>
+              <a:t>pre-processing – name of the mask defining pixels of interest</a:t>
             </a:r>
             <a:endParaRPr lang="en-GB" sz="700" dirty="0" smtClean="0">
               <a:solidFill>
@@ -8439,7 +8701,7 @@
           <p:cNvPr id="93" name="Rectangle 92">
             <a:extLst>
               <a:ext uri="{FF2B5EF4-FFF2-40B4-BE49-F238E27FC236}">
-                <a16:creationId xmlns:a16="http://schemas.microsoft.com/office/drawing/2014/main" xmlns="" id="{FBD453A1-A3AF-40EE-837B-2CADAC3A6221}"/>
+                <a16:creationId xmlns="" xmlns:a16="http://schemas.microsoft.com/office/drawing/2014/main" id="{FBD453A1-A3AF-40EE-837B-2CADAC3A6221}"/>
               </a:ext>
             </a:extLst>
           </p:cNvPr>
@@ -8491,7 +8753,15 @@
                   <a:schemeClr val="bg1"/>
                 </a:solidFill>
               </a:rPr>
-              <a:t>total spectral and related m/z values – pixels number for the given mask - height and width of the image</a:t>
+              <a:t>total spectral and related m/z values </a:t>
+            </a:r>
+            <a:r>
+              <a:rPr lang="en-GB" sz="700" dirty="0" smtClean="0">
+                <a:solidFill>
+                  <a:schemeClr val="bg1"/>
+                </a:solidFill>
+              </a:rPr>
+              <a:t>– number of pixels of interest</a:t>
             </a:r>
             <a:endParaRPr lang="en-GB" sz="700" dirty="0" smtClean="0">
               <a:solidFill>
@@ -8506,7 +8776,7 @@
           <p:cNvPr id="94" name="Rectangle 93">
             <a:extLst>
               <a:ext uri="{FF2B5EF4-FFF2-40B4-BE49-F238E27FC236}">
-                <a16:creationId xmlns:a16="http://schemas.microsoft.com/office/drawing/2014/main" xmlns="" id="{FBD453A1-A3AF-40EE-837B-2CADAC3A6221}"/>
+                <a16:creationId xmlns="" xmlns:a16="http://schemas.microsoft.com/office/drawing/2014/main" id="{FBD453A1-A3AF-40EE-837B-2CADAC3A6221}"/>
               </a:ext>
             </a:extLst>
           </p:cNvPr>
@@ -8566,7 +8836,7 @@
                   <a:schemeClr val="bg1"/>
                 </a:solidFill>
               </a:rPr>
-              <a:t> of files of interest - pixels of interest mask - </a:t>
+              <a:t> of files of interest - </a:t>
             </a:r>
             <a:r>
               <a:rPr lang="en-GB" sz="700" dirty="0" smtClean="0">
@@ -8574,7 +8844,7 @@
                   <a:schemeClr val="bg1"/>
                 </a:solidFill>
               </a:rPr>
-              <a:t>total </a:t>
+              <a:t>name </a:t>
             </a:r>
             <a:r>
               <a:rPr lang="en-GB" sz="700" dirty="0">
@@ -8582,7 +8852,7 @@
                   <a:schemeClr val="bg1"/>
                 </a:solidFill>
               </a:rPr>
-              <a:t>spectral and related m/z </a:t>
+              <a:t>of the mask defining pixels of </a:t>
             </a:r>
             <a:r>
               <a:rPr lang="en-GB" sz="700" dirty="0" smtClean="0">
@@ -8590,23 +8860,7 @@
                   <a:schemeClr val="bg1"/>
                 </a:solidFill>
               </a:rPr>
-              <a:t>values - </a:t>
-            </a:r>
-            <a:r>
-              <a:rPr lang="en-GB" sz="700" dirty="0">
-                <a:solidFill>
-                  <a:schemeClr val="bg1"/>
-                </a:solidFill>
-              </a:rPr>
-              <a:t>path to the folder where all results will be saved</a:t>
-            </a:r>
-            <a:r>
-              <a:rPr lang="en-GB" sz="700" dirty="0" smtClean="0">
-                <a:solidFill>
-                  <a:schemeClr val="bg1"/>
-                </a:solidFill>
-              </a:rPr>
-              <a:t> </a:t>
+              <a:t>interest - outputs of step 1</a:t>
             </a:r>
             <a:endParaRPr lang="en-GB" sz="700" dirty="0">
               <a:solidFill>
@@ -8621,7 +8875,7 @@
           <p:cNvPr id="96" name="Rectangle 95">
             <a:extLst>
               <a:ext uri="{FF2B5EF4-FFF2-40B4-BE49-F238E27FC236}">
-                <a16:creationId xmlns:a16="http://schemas.microsoft.com/office/drawing/2014/main" xmlns="" id="{FBD453A1-A3AF-40EE-837B-2CADAC3A6221}"/>
+                <a16:creationId xmlns="" xmlns:a16="http://schemas.microsoft.com/office/drawing/2014/main" id="{FBD453A1-A3AF-40EE-837B-2CADAC3A6221}"/>
               </a:ext>
             </a:extLst>
           </p:cNvPr>
@@ -8683,11 +8937,6 @@
               </a:rPr>
               <a:t> (list of all peaks found with the position of the centroids, the right and left limits of the peak, the total counts per peak)</a:t>
             </a:r>
-            <a:endParaRPr lang="en-GB" sz="700" dirty="0" smtClean="0">
-              <a:solidFill>
-                <a:schemeClr val="bg1"/>
-              </a:solidFill>
-            </a:endParaRPr>
           </a:p>
         </p:txBody>
       </p:sp>
@@ -8757,7 +9006,7 @@
           <p:cNvPr id="98" name="Rectangle 97">
             <a:extLst>
               <a:ext uri="{FF2B5EF4-FFF2-40B4-BE49-F238E27FC236}">
-                <a16:creationId xmlns:a16="http://schemas.microsoft.com/office/drawing/2014/main" xmlns="" id="{FBD453A1-A3AF-40EE-837B-2CADAC3A6221}"/>
+                <a16:creationId xmlns="" xmlns:a16="http://schemas.microsoft.com/office/drawing/2014/main" id="{FBD453A1-A3AF-40EE-837B-2CADAC3A6221}"/>
               </a:ext>
             </a:extLst>
           </p:cNvPr>
@@ -8888,7 +9137,7 @@
           <p:cNvPr id="99" name="Rectangle 98">
             <a:extLst>
               <a:ext uri="{FF2B5EF4-FFF2-40B4-BE49-F238E27FC236}">
-                <a16:creationId xmlns:a16="http://schemas.microsoft.com/office/drawing/2014/main" xmlns="" id="{FBD453A1-A3AF-40EE-837B-2CADAC3A6221}"/>
+                <a16:creationId xmlns="" xmlns:a16="http://schemas.microsoft.com/office/drawing/2014/main" id="{FBD453A1-A3AF-40EE-837B-2CADAC3A6221}"/>
               </a:ext>
             </a:extLst>
           </p:cNvPr>
@@ -8990,11 +9239,6 @@
               </a:rPr>
               <a:t> (only peaks assigned to something are kept) with more information per peak</a:t>
             </a:r>
-            <a:endParaRPr lang="en-GB" sz="700" dirty="0" smtClean="0">
-              <a:solidFill>
-                <a:schemeClr val="bg1"/>
-              </a:solidFill>
-            </a:endParaRPr>
           </a:p>
         </p:txBody>
       </p:sp>
@@ -9003,7 +9247,7 @@
           <p:cNvPr id="100" name="Rectangle 99">
             <a:extLst>
               <a:ext uri="{FF2B5EF4-FFF2-40B4-BE49-F238E27FC236}">
-                <a16:creationId xmlns:a16="http://schemas.microsoft.com/office/drawing/2014/main" xmlns="" id="{FBD453A1-A3AF-40EE-837B-2CADAC3A6221}"/>
+                <a16:creationId xmlns="" xmlns:a16="http://schemas.microsoft.com/office/drawing/2014/main" id="{FBD453A1-A3AF-40EE-837B-2CADAC3A6221}"/>
               </a:ext>
             </a:extLst>
           </p:cNvPr>
@@ -9102,7 +9346,7 @@
           <p:cNvPr id="101" name="Rectangle 100">
             <a:extLst>
               <a:ext uri="{FF2B5EF4-FFF2-40B4-BE49-F238E27FC236}">
-                <a16:creationId xmlns:a16="http://schemas.microsoft.com/office/drawing/2014/main" xmlns="" id="{FBD453A1-A3AF-40EE-837B-2CADAC3A6221}"/>
+                <a16:creationId xmlns="" xmlns:a16="http://schemas.microsoft.com/office/drawing/2014/main" id="{FBD453A1-A3AF-40EE-837B-2CADAC3A6221}"/>
               </a:ext>
             </a:extLst>
           </p:cNvPr>
@@ -9188,7 +9432,7 @@
           <p:cNvPr id="102" name="Rectangle 101">
             <a:extLst>
               <a:ext uri="{FF2B5EF4-FFF2-40B4-BE49-F238E27FC236}">
-                <a16:creationId xmlns:a16="http://schemas.microsoft.com/office/drawing/2014/main" xmlns="" id="{FBD453A1-A3AF-40EE-837B-2CADAC3A6221}"/>
+                <a16:creationId xmlns="" xmlns:a16="http://schemas.microsoft.com/office/drawing/2014/main" id="{FBD453A1-A3AF-40EE-837B-2CADAC3A6221}"/>
               </a:ext>
             </a:extLst>
           </p:cNvPr>
@@ -9242,11 +9486,6 @@
               </a:rPr>
               <a:t>the vector with all m/z values that belong to anything requested in the inputs file</a:t>
             </a:r>
-            <a:endParaRPr lang="en-GB" sz="700" dirty="0" smtClean="0">
-              <a:solidFill>
-                <a:schemeClr val="bg1"/>
-              </a:solidFill>
-            </a:endParaRPr>
           </a:p>
         </p:txBody>
       </p:sp>
@@ -9255,7 +9494,7 @@
           <p:cNvPr id="103" name="Rectangle 102">
             <a:extLst>
               <a:ext uri="{FF2B5EF4-FFF2-40B4-BE49-F238E27FC236}">
-                <a16:creationId xmlns:a16="http://schemas.microsoft.com/office/drawing/2014/main" xmlns="" id="{6B8F8C16-8BF5-44CE-A165-28895472E11E}"/>
+                <a16:creationId xmlns="" xmlns:a16="http://schemas.microsoft.com/office/drawing/2014/main" id="{6B8F8C16-8BF5-44CE-A165-28895472E11E}"/>
               </a:ext>
             </a:extLst>
           </p:cNvPr>
@@ -9312,7 +9551,7 @@
           <p:cNvPr id="104" name="Rectangle 103">
             <a:extLst>
               <a:ext uri="{FF2B5EF4-FFF2-40B4-BE49-F238E27FC236}">
-                <a16:creationId xmlns:a16="http://schemas.microsoft.com/office/drawing/2014/main" xmlns="" id="{6B8F8C16-8BF5-44CE-A165-28895472E11E}"/>
+                <a16:creationId xmlns="" xmlns:a16="http://schemas.microsoft.com/office/drawing/2014/main" id="{6B8F8C16-8BF5-44CE-A165-28895472E11E}"/>
               </a:ext>
             </a:extLst>
           </p:cNvPr>
@@ -9370,7 +9609,7 @@
           <p:cNvPr id="105" name="Rectangle 104">
             <a:extLst>
               <a:ext uri="{FF2B5EF4-FFF2-40B4-BE49-F238E27FC236}">
-                <a16:creationId xmlns:a16="http://schemas.microsoft.com/office/drawing/2014/main" xmlns="" id="{6B8F8C16-8BF5-44CE-A165-28895472E11E}"/>
+                <a16:creationId xmlns="" xmlns:a16="http://schemas.microsoft.com/office/drawing/2014/main" id="{6B8F8C16-8BF5-44CE-A165-28895472E11E}"/>
               </a:ext>
             </a:extLst>
           </p:cNvPr>
@@ -9427,7 +9666,7 @@
           <p:cNvPr id="106" name="Rectangle 105">
             <a:extLst>
               <a:ext uri="{FF2B5EF4-FFF2-40B4-BE49-F238E27FC236}">
-                <a16:creationId xmlns:a16="http://schemas.microsoft.com/office/drawing/2014/main" xmlns="" id="{6B8F8C16-8BF5-44CE-A165-28895472E11E}"/>
+                <a16:creationId xmlns="" xmlns:a16="http://schemas.microsoft.com/office/drawing/2014/main" id="{6B8F8C16-8BF5-44CE-A165-28895472E11E}"/>
               </a:ext>
             </a:extLst>
           </p:cNvPr>
@@ -9484,7 +9723,7 @@
           <p:cNvPr id="107" name="Rectangle 106">
             <a:extLst>
               <a:ext uri="{FF2B5EF4-FFF2-40B4-BE49-F238E27FC236}">
-                <a16:creationId xmlns:a16="http://schemas.microsoft.com/office/drawing/2014/main" xmlns="" id="{6B8F8C16-8BF5-44CE-A165-28895472E11E}"/>
+                <a16:creationId xmlns="" xmlns:a16="http://schemas.microsoft.com/office/drawing/2014/main" id="{6B8F8C16-8BF5-44CE-A165-28895472E11E}"/>
               </a:ext>
             </a:extLst>
           </p:cNvPr>
@@ -9541,7 +9780,7 @@
           <p:cNvPr id="108" name="Rectangle 107">
             <a:extLst>
               <a:ext uri="{FF2B5EF4-FFF2-40B4-BE49-F238E27FC236}">
-                <a16:creationId xmlns:a16="http://schemas.microsoft.com/office/drawing/2014/main" xmlns="" id="{FBD453A1-A3AF-40EE-837B-2CADAC3A6221}"/>
+                <a16:creationId xmlns="" xmlns:a16="http://schemas.microsoft.com/office/drawing/2014/main" id="{FBD453A1-A3AF-40EE-837B-2CADAC3A6221}"/>
               </a:ext>
             </a:extLst>
           </p:cNvPr>
@@ -9608,7 +9847,7 @@
           <p:cNvPr id="109" name="Rectangle 108">
             <a:extLst>
               <a:ext uri="{FF2B5EF4-FFF2-40B4-BE49-F238E27FC236}">
-                <a16:creationId xmlns:a16="http://schemas.microsoft.com/office/drawing/2014/main" xmlns="" id="{6B8F8C16-8BF5-44CE-A165-28895472E11E}"/>
+                <a16:creationId xmlns="" xmlns:a16="http://schemas.microsoft.com/office/drawing/2014/main" id="{6B8F8C16-8BF5-44CE-A165-28895472E11E}"/>
               </a:ext>
             </a:extLst>
           </p:cNvPr>
@@ -9662,7 +9901,7 @@
           <p:cNvPr id="110" name="Rectangle 109">
             <a:extLst>
               <a:ext uri="{FF2B5EF4-FFF2-40B4-BE49-F238E27FC236}">
-                <a16:creationId xmlns:a16="http://schemas.microsoft.com/office/drawing/2014/main" xmlns="" id="{6B8F8C16-8BF5-44CE-A165-28895472E11E}"/>
+                <a16:creationId xmlns="" xmlns:a16="http://schemas.microsoft.com/office/drawing/2014/main" id="{6B8F8C16-8BF5-44CE-A165-28895472E11E}"/>
               </a:ext>
             </a:extLst>
           </p:cNvPr>
@@ -9717,7 +9956,7 @@
           <p:cNvPr id="111" name="Rectangle 110">
             <a:extLst>
               <a:ext uri="{FF2B5EF4-FFF2-40B4-BE49-F238E27FC236}">
-                <a16:creationId xmlns:a16="http://schemas.microsoft.com/office/drawing/2014/main" xmlns="" id="{FBD453A1-A3AF-40EE-837B-2CADAC3A6221}"/>
+                <a16:creationId xmlns="" xmlns:a16="http://schemas.microsoft.com/office/drawing/2014/main" id="{FBD453A1-A3AF-40EE-837B-2CADAC3A6221}"/>
               </a:ext>
             </a:extLst>
           </p:cNvPr>
@@ -9914,7 +10153,7 @@
           <p:cNvPr id="112" name="Rectangle 111">
             <a:extLst>
               <a:ext uri="{FF2B5EF4-FFF2-40B4-BE49-F238E27FC236}">
-                <a16:creationId xmlns:a16="http://schemas.microsoft.com/office/drawing/2014/main" xmlns="" id="{FBD453A1-A3AF-40EE-837B-2CADAC3A6221}"/>
+                <a16:creationId xmlns="" xmlns:a16="http://schemas.microsoft.com/office/drawing/2014/main" id="{FBD453A1-A3AF-40EE-837B-2CADAC3A6221}"/>
               </a:ext>
             </a:extLst>
           </p:cNvPr>
@@ -10117,14 +10356,6 @@
               </a:rPr>
               <a:t>)</a:t>
             </a:r>
-            <a:endParaRPr lang="en-GB" sz="700" dirty="0">
-              <a:solidFill>
-                <a:schemeClr val="accent3">
-                  <a:lumMod val="50000"/>
-                </a:schemeClr>
-              </a:solidFill>
-              <a:latin typeface="Ubuntu Mono" panose="020B0509030602030204" pitchFamily="49" charset="0"/>
-            </a:endParaRPr>
           </a:p>
         </p:txBody>
       </p:sp>
@@ -10133,7 +10364,7 @@
           <p:cNvPr id="113" name="Rectangle 112">
             <a:extLst>
               <a:ext uri="{FF2B5EF4-FFF2-40B4-BE49-F238E27FC236}">
-                <a16:creationId xmlns:a16="http://schemas.microsoft.com/office/drawing/2014/main" xmlns="" id="{FBD453A1-A3AF-40EE-837B-2CADAC3A6221}"/>
+                <a16:creationId xmlns="" xmlns:a16="http://schemas.microsoft.com/office/drawing/2014/main" id="{FBD453A1-A3AF-40EE-837B-2CADAC3A6221}"/>
               </a:ext>
             </a:extLst>
           </p:cNvPr>
@@ -10232,7 +10463,7 @@
           <p:cNvPr id="114" name="Rectangle 113">
             <a:extLst>
               <a:ext uri="{FF2B5EF4-FFF2-40B4-BE49-F238E27FC236}">
-                <a16:creationId xmlns:a16="http://schemas.microsoft.com/office/drawing/2014/main" xmlns="" id="{FBD453A1-A3AF-40EE-837B-2CADAC3A6221}"/>
+                <a16:creationId xmlns="" xmlns:a16="http://schemas.microsoft.com/office/drawing/2014/main" id="{FBD453A1-A3AF-40EE-837B-2CADAC3A6221}"/>
               </a:ext>
             </a:extLst>
           </p:cNvPr>
@@ -10331,7 +10562,7 @@
           <p:cNvPr id="115" name="Rectangle 114">
             <a:extLst>
               <a:ext uri="{FF2B5EF4-FFF2-40B4-BE49-F238E27FC236}">
-                <a16:creationId xmlns:a16="http://schemas.microsoft.com/office/drawing/2014/main" xmlns="" id="{FBD453A1-A3AF-40EE-837B-2CADAC3A6221}"/>
+                <a16:creationId xmlns="" xmlns:a16="http://schemas.microsoft.com/office/drawing/2014/main" id="{FBD453A1-A3AF-40EE-837B-2CADAC3A6221}"/>
               </a:ext>
             </a:extLst>
           </p:cNvPr>
@@ -10401,11 +10632,6 @@
               </a:rPr>
               <a:t> files that are necessary to plot the results are saved</a:t>
             </a:r>
-            <a:endParaRPr lang="en-GB" sz="700" dirty="0" smtClean="0">
-              <a:solidFill>
-                <a:schemeClr val="bg1"/>
-              </a:solidFill>
-            </a:endParaRPr>
           </a:p>
         </p:txBody>
       </p:sp>
@@ -10414,7 +10640,7 @@
           <p:cNvPr id="116" name="Rectangle 115">
             <a:extLst>
               <a:ext uri="{FF2B5EF4-FFF2-40B4-BE49-F238E27FC236}">
-                <a16:creationId xmlns:a16="http://schemas.microsoft.com/office/drawing/2014/main" xmlns="" id="{6B8F8C16-8BF5-44CE-A165-28895472E11E}"/>
+                <a16:creationId xmlns="" xmlns:a16="http://schemas.microsoft.com/office/drawing/2014/main" id="{6B8F8C16-8BF5-44CE-A165-28895472E11E}"/>
               </a:ext>
             </a:extLst>
           </p:cNvPr>
@@ -10471,7 +10697,7 @@
           <p:cNvPr id="117" name="Rectangle 116">
             <a:extLst>
               <a:ext uri="{FF2B5EF4-FFF2-40B4-BE49-F238E27FC236}">
-                <a16:creationId xmlns:a16="http://schemas.microsoft.com/office/drawing/2014/main" xmlns="" id="{6B8F8C16-8BF5-44CE-A165-28895472E11E}"/>
+                <a16:creationId xmlns="" xmlns:a16="http://schemas.microsoft.com/office/drawing/2014/main" id="{6B8F8C16-8BF5-44CE-A165-28895472E11E}"/>
               </a:ext>
             </a:extLst>
           </p:cNvPr>
@@ -10528,7 +10754,7 @@
           <p:cNvPr id="118" name="Rectangle 117">
             <a:extLst>
               <a:ext uri="{FF2B5EF4-FFF2-40B4-BE49-F238E27FC236}">
-                <a16:creationId xmlns:a16="http://schemas.microsoft.com/office/drawing/2014/main" xmlns="" id="{FBD453A1-A3AF-40EE-837B-2CADAC3A6221}"/>
+                <a16:creationId xmlns="" xmlns:a16="http://schemas.microsoft.com/office/drawing/2014/main" id="{FBD453A1-A3AF-40EE-837B-2CADAC3A6221}"/>
               </a:ext>
             </a:extLst>
           </p:cNvPr>
@@ -10598,11 +10824,6 @@
               </a:rPr>
               <a:t> for the 10 top loadings are saved – tables with the peaks that belong to each component are saved</a:t>
             </a:r>
-            <a:endParaRPr lang="en-GB" sz="700" dirty="0" smtClean="0">
-              <a:solidFill>
-                <a:schemeClr val="bg1"/>
-              </a:solidFill>
-            </a:endParaRPr>
           </a:p>
         </p:txBody>
       </p:sp>
@@ -10611,7 +10832,7 @@
           <p:cNvPr id="119" name="Rectangle 118">
             <a:extLst>
               <a:ext uri="{FF2B5EF4-FFF2-40B4-BE49-F238E27FC236}">
-                <a16:creationId xmlns:a16="http://schemas.microsoft.com/office/drawing/2014/main" xmlns="" id="{6B8F8C16-8BF5-44CE-A165-28895472E11E}"/>
+                <a16:creationId xmlns="" xmlns:a16="http://schemas.microsoft.com/office/drawing/2014/main" id="{6B8F8C16-8BF5-44CE-A165-28895472E11E}"/>
               </a:ext>
             </a:extLst>
           </p:cNvPr>
@@ -10666,7 +10887,7 @@
           <p:cNvPr id="125" name="Rectangle 124">
             <a:extLst>
               <a:ext uri="{FF2B5EF4-FFF2-40B4-BE49-F238E27FC236}">
-                <a16:creationId xmlns:a16="http://schemas.microsoft.com/office/drawing/2014/main" xmlns="" id="{FBD453A1-A3AF-40EE-837B-2CADAC3A6221}"/>
+                <a16:creationId xmlns="" xmlns:a16="http://schemas.microsoft.com/office/drawing/2014/main" id="{FBD453A1-A3AF-40EE-837B-2CADAC3A6221}"/>
               </a:ext>
             </a:extLst>
           </p:cNvPr>
@@ -10863,7 +11084,7 @@
           <p:cNvPr id="126" name="Rectangle 125">
             <a:extLst>
               <a:ext uri="{FF2B5EF4-FFF2-40B4-BE49-F238E27FC236}">
-                <a16:creationId xmlns:a16="http://schemas.microsoft.com/office/drawing/2014/main" xmlns="" id="{FBD453A1-A3AF-40EE-837B-2CADAC3A6221}"/>
+                <a16:creationId xmlns="" xmlns:a16="http://schemas.microsoft.com/office/drawing/2014/main" id="{FBD453A1-A3AF-40EE-837B-2CADAC3A6221}"/>
               </a:ext>
             </a:extLst>
           </p:cNvPr>
@@ -10962,7 +11183,7 @@
           <p:cNvPr id="127" name="Rectangle 126">
             <a:extLst>
               <a:ext uri="{FF2B5EF4-FFF2-40B4-BE49-F238E27FC236}">
-                <a16:creationId xmlns:a16="http://schemas.microsoft.com/office/drawing/2014/main" xmlns="" id="{6B8F8C16-8BF5-44CE-A165-28895472E11E}"/>
+                <a16:creationId xmlns="" xmlns:a16="http://schemas.microsoft.com/office/drawing/2014/main" id="{6B8F8C16-8BF5-44CE-A165-28895472E11E}"/>
               </a:ext>
             </a:extLst>
           </p:cNvPr>
@@ -11020,7 +11241,7 @@
           <p:cNvPr id="128" name="Rectangle 127">
             <a:extLst>
               <a:ext uri="{FF2B5EF4-FFF2-40B4-BE49-F238E27FC236}">
-                <a16:creationId xmlns:a16="http://schemas.microsoft.com/office/drawing/2014/main" xmlns="" id="{FBD453A1-A3AF-40EE-837B-2CADAC3A6221}"/>
+                <a16:creationId xmlns="" xmlns:a16="http://schemas.microsoft.com/office/drawing/2014/main" id="{FBD453A1-A3AF-40EE-837B-2CADAC3A6221}"/>
               </a:ext>
             </a:extLst>
           </p:cNvPr>
@@ -11074,11 +11295,6 @@
               </a:rPr>
               <a:t>SIIs are saved in individual folders, one per list of molecules of interest</a:t>
             </a:r>
-            <a:endParaRPr lang="en-GB" sz="700" dirty="0" smtClean="0">
-              <a:solidFill>
-                <a:schemeClr val="bg1"/>
-              </a:solidFill>
-            </a:endParaRPr>
           </a:p>
         </p:txBody>
       </p:sp>
@@ -11087,7 +11303,7 @@
           <p:cNvPr id="131" name="Rectangle 130">
             <a:extLst>
               <a:ext uri="{FF2B5EF4-FFF2-40B4-BE49-F238E27FC236}">
-                <a16:creationId xmlns:a16="http://schemas.microsoft.com/office/drawing/2014/main" xmlns="" id="{6B8F8C16-8BF5-44CE-A165-28895472E11E}"/>
+                <a16:creationId xmlns="" xmlns:a16="http://schemas.microsoft.com/office/drawing/2014/main" id="{6B8F8C16-8BF5-44CE-A165-28895472E11E}"/>
               </a:ext>
             </a:extLst>
           </p:cNvPr>
@@ -11096,8 +11312,8 @@
         </p:nvSpPr>
         <p:spPr>
           <a:xfrm>
-            <a:off x="10208021" y="396420"/>
-            <a:ext cx="1620000" cy="720000"/>
+            <a:off x="9392220" y="759726"/>
+            <a:ext cx="2435801" cy="360000"/>
           </a:xfrm>
           <a:prstGeom prst="rect">
             <a:avLst/>
@@ -11180,7 +11396,7 @@
           <p:cNvPr id="132" name="Rectangle 131">
             <a:extLst>
               <a:ext uri="{FF2B5EF4-FFF2-40B4-BE49-F238E27FC236}">
-                <a16:creationId xmlns:a16="http://schemas.microsoft.com/office/drawing/2014/main" xmlns="" id="{6B8F8C16-8BF5-44CE-A165-28895472E11E}"/>
+                <a16:creationId xmlns="" xmlns:a16="http://schemas.microsoft.com/office/drawing/2014/main" id="{6B8F8C16-8BF5-44CE-A165-28895472E11E}"/>
               </a:ext>
             </a:extLst>
           </p:cNvPr>
@@ -11189,7 +11405,7 @@
         </p:nvSpPr>
         <p:spPr>
           <a:xfrm>
-            <a:off x="10208021" y="5513237"/>
+            <a:off x="10208021" y="5521052"/>
             <a:ext cx="1620000" cy="360000"/>
           </a:xfrm>
           <a:prstGeom prst="rect">
@@ -11279,7 +11495,7 @@
           <p:cNvPr id="129" name="Straight Arrow Connector 128">
             <a:extLst>
               <a:ext uri="{FF2B5EF4-FFF2-40B4-BE49-F238E27FC236}">
-                <a16:creationId xmlns:a16="http://schemas.microsoft.com/office/drawing/2014/main" xmlns="" id="{4FE9E570-253C-4922-BA49-B370F36F4CAA}"/>
+                <a16:creationId xmlns="" xmlns:a16="http://schemas.microsoft.com/office/drawing/2014/main" id="{4FE9E570-253C-4922-BA49-B370F36F4CAA}"/>
               </a:ext>
             </a:extLst>
           </p:cNvPr>
@@ -11324,7 +11540,7 @@
           <p:cNvPr id="5" name="Rectangle 4">
             <a:extLst>
               <a:ext uri="{FF2B5EF4-FFF2-40B4-BE49-F238E27FC236}">
-                <a16:creationId xmlns:a16="http://schemas.microsoft.com/office/drawing/2014/main" xmlns="" id="{FBD453A1-A3AF-40EE-837B-2CADAC3A6221}"/>
+                <a16:creationId xmlns="" xmlns:a16="http://schemas.microsoft.com/office/drawing/2014/main" id="{FBD453A1-A3AF-40EE-837B-2CADAC3A6221}"/>
               </a:ext>
             </a:extLst>
           </p:cNvPr>
@@ -11569,7 +11785,18 @@
                 </a:solidFill>
                 <a:latin typeface="Ubuntu Mono" panose="020B0509030602030204" pitchFamily="49" charset="0"/>
               </a:rPr>
-              <a:t>, </a:t>
+              <a:t>, regionsNum2keep, regionsNum2fill, </a:t>
+            </a:r>
+            <a:r>
+              <a:rPr lang="en-GB" sz="700" dirty="0" err="1">
+                <a:solidFill>
+                  <a:schemeClr val="accent3">
+                    <a:lumMod val="50000"/>
+                  </a:schemeClr>
+                </a:solidFill>
+                <a:latin typeface="Ubuntu Mono" panose="020B0509030602030204" pitchFamily="49" charset="0"/>
+              </a:rPr>
+              <a:t>output_mask</a:t>
             </a:r>
             <a:r>
               <a:rPr lang="en-GB" sz="700" dirty="0">
@@ -11580,39 +11807,6 @@
                 </a:solidFill>
                 <a:latin typeface="Ubuntu Mono" panose="020B0509030602030204" pitchFamily="49" charset="0"/>
               </a:rPr>
-              <a:t>regionsNum2keep, </a:t>
-            </a:r>
-            <a:r>
-              <a:rPr lang="en-GB" sz="700" dirty="0">
-                <a:solidFill>
-                  <a:schemeClr val="accent3">
-                    <a:lumMod val="50000"/>
-                  </a:schemeClr>
-                </a:solidFill>
-                <a:latin typeface="Ubuntu Mono" panose="020B0509030602030204" pitchFamily="49" charset="0"/>
-              </a:rPr>
-              <a:t>regionsNum2fill, </a:t>
-            </a:r>
-            <a:r>
-              <a:rPr lang="en-GB" sz="700" dirty="0" err="1">
-                <a:solidFill>
-                  <a:schemeClr val="accent3">
-                    <a:lumMod val="50000"/>
-                  </a:schemeClr>
-                </a:solidFill>
-                <a:latin typeface="Ubuntu Mono" panose="020B0509030602030204" pitchFamily="49" charset="0"/>
-              </a:rPr>
-              <a:t>output_mask</a:t>
-            </a:r>
-            <a:r>
-              <a:rPr lang="en-GB" sz="700" dirty="0">
-                <a:solidFill>
-                  <a:schemeClr val="accent3">
-                    <a:lumMod val="50000"/>
-                  </a:schemeClr>
-                </a:solidFill>
-                <a:latin typeface="Ubuntu Mono" panose="020B0509030602030204" pitchFamily="49" charset="0"/>
-              </a:rPr>
               <a:t> )</a:t>
             </a:r>
           </a:p>
@@ -11623,7 +11817,7 @@
           <p:cNvPr id="10" name="Rectangle 9">
             <a:extLst>
               <a:ext uri="{FF2B5EF4-FFF2-40B4-BE49-F238E27FC236}">
-                <a16:creationId xmlns:a16="http://schemas.microsoft.com/office/drawing/2014/main" xmlns="" id="{6B8F8C16-8BF5-44CE-A165-28895472E11E}"/>
+                <a16:creationId xmlns="" xmlns:a16="http://schemas.microsoft.com/office/drawing/2014/main" id="{6B8F8C16-8BF5-44CE-A165-28895472E11E}"/>
               </a:ext>
             </a:extLst>
           </p:cNvPr>
@@ -11684,7 +11878,7 @@
           <p:cNvPr id="176" name="Rectangle 175">
             <a:extLst>
               <a:ext uri="{FF2B5EF4-FFF2-40B4-BE49-F238E27FC236}">
-                <a16:creationId xmlns:a16="http://schemas.microsoft.com/office/drawing/2014/main" xmlns="" id="{FBD453A1-A3AF-40EE-837B-2CADAC3A6221}"/>
+                <a16:creationId xmlns="" xmlns:a16="http://schemas.microsoft.com/office/drawing/2014/main" id="{FBD453A1-A3AF-40EE-837B-2CADAC3A6221}"/>
               </a:ext>
             </a:extLst>
           </p:cNvPr>
@@ -11803,7 +11997,7 @@
           <p:cNvPr id="92" name="Rectangle 91">
             <a:extLst>
               <a:ext uri="{FF2B5EF4-FFF2-40B4-BE49-F238E27FC236}">
-                <a16:creationId xmlns:a16="http://schemas.microsoft.com/office/drawing/2014/main" xmlns="" id="{FBD453A1-A3AF-40EE-837B-2CADAC3A6221}"/>
+                <a16:creationId xmlns="" xmlns:a16="http://schemas.microsoft.com/office/drawing/2014/main" id="{FBD453A1-A3AF-40EE-837B-2CADAC3A6221}"/>
               </a:ext>
             </a:extLst>
           </p:cNvPr>
@@ -11945,11 +12139,6 @@
               </a:rPr>
               <a:t> – how many regions will be kept – how many regions will be filled – name of the new mask</a:t>
             </a:r>
-            <a:endParaRPr lang="en-GB" sz="700" dirty="0" smtClean="0">
-              <a:solidFill>
-                <a:schemeClr val="bg1"/>
-              </a:solidFill>
-            </a:endParaRPr>
           </a:p>
         </p:txBody>
       </p:sp>
@@ -11958,7 +12147,7 @@
           <p:cNvPr id="93" name="Rectangle 92">
             <a:extLst>
               <a:ext uri="{FF2B5EF4-FFF2-40B4-BE49-F238E27FC236}">
-                <a16:creationId xmlns:a16="http://schemas.microsoft.com/office/drawing/2014/main" xmlns="" id="{FBD453A1-A3AF-40EE-837B-2CADAC3A6221}"/>
+                <a16:creationId xmlns="" xmlns:a16="http://schemas.microsoft.com/office/drawing/2014/main" id="{FBD453A1-A3AF-40EE-837B-2CADAC3A6221}"/>
               </a:ext>
             </a:extLst>
           </p:cNvPr>
@@ -12036,11 +12225,6 @@
               </a:rPr>
               <a:t> variable region of interest in it</a:t>
             </a:r>
-            <a:endParaRPr lang="en-GB" sz="700" dirty="0" smtClean="0">
-              <a:solidFill>
-                <a:schemeClr val="bg1"/>
-              </a:solidFill>
-            </a:endParaRPr>
           </a:p>
         </p:txBody>
       </p:sp>
@@ -12110,7 +12294,7 @@
           <p:cNvPr id="103" name="Rectangle 102">
             <a:extLst>
               <a:ext uri="{FF2B5EF4-FFF2-40B4-BE49-F238E27FC236}">
-                <a16:creationId xmlns:a16="http://schemas.microsoft.com/office/drawing/2014/main" xmlns="" id="{6B8F8C16-8BF5-44CE-A165-28895472E11E}"/>
+                <a16:creationId xmlns="" xmlns:a16="http://schemas.microsoft.com/office/drawing/2014/main" id="{6B8F8C16-8BF5-44CE-A165-28895472E11E}"/>
               </a:ext>
             </a:extLst>
           </p:cNvPr>
@@ -12167,7 +12351,7 @@
           <p:cNvPr id="46" name="Rectangle 45">
             <a:extLst>
               <a:ext uri="{FF2B5EF4-FFF2-40B4-BE49-F238E27FC236}">
-                <a16:creationId xmlns:a16="http://schemas.microsoft.com/office/drawing/2014/main" xmlns="" id="{6B8F8C16-8BF5-44CE-A165-28895472E11E}"/>
+                <a16:creationId xmlns="" xmlns:a16="http://schemas.microsoft.com/office/drawing/2014/main" id="{6B8F8C16-8BF5-44CE-A165-28895472E11E}"/>
               </a:ext>
             </a:extLst>
           </p:cNvPr>
@@ -12236,7 +12420,7 @@
           <p:cNvPr id="47" name="Rectangle 46">
             <a:extLst>
               <a:ext uri="{FF2B5EF4-FFF2-40B4-BE49-F238E27FC236}">
-                <a16:creationId xmlns:a16="http://schemas.microsoft.com/office/drawing/2014/main" xmlns="" id="{FBD453A1-A3AF-40EE-837B-2CADAC3A6221}"/>
+                <a16:creationId xmlns="" xmlns:a16="http://schemas.microsoft.com/office/drawing/2014/main" id="{FBD453A1-A3AF-40EE-837B-2CADAC3A6221}"/>
               </a:ext>
             </a:extLst>
           </p:cNvPr>
@@ -12392,7 +12576,7 @@
           <p:cNvPr id="48" name="Rectangle 47">
             <a:extLst>
               <a:ext uri="{FF2B5EF4-FFF2-40B4-BE49-F238E27FC236}">
-                <a16:creationId xmlns:a16="http://schemas.microsoft.com/office/drawing/2014/main" xmlns="" id="{6B8F8C16-8BF5-44CE-A165-28895472E11E}"/>
+                <a16:creationId xmlns="" xmlns:a16="http://schemas.microsoft.com/office/drawing/2014/main" id="{6B8F8C16-8BF5-44CE-A165-28895472E11E}"/>
               </a:ext>
             </a:extLst>
           </p:cNvPr>
@@ -12462,7 +12646,7 @@
           <p:cNvPr id="49" name="Rectangle 48">
             <a:extLst>
               <a:ext uri="{FF2B5EF4-FFF2-40B4-BE49-F238E27FC236}">
-                <a16:creationId xmlns:a16="http://schemas.microsoft.com/office/drawing/2014/main" xmlns="" id="{6B8F8C16-8BF5-44CE-A165-28895472E11E}"/>
+                <a16:creationId xmlns="" xmlns:a16="http://schemas.microsoft.com/office/drawing/2014/main" id="{6B8F8C16-8BF5-44CE-A165-28895472E11E}"/>
               </a:ext>
             </a:extLst>
           </p:cNvPr>
@@ -12528,7 +12712,7 @@
           <p:cNvPr id="50" name="Rectangle 49">
             <a:extLst>
               <a:ext uri="{FF2B5EF4-FFF2-40B4-BE49-F238E27FC236}">
-                <a16:creationId xmlns:a16="http://schemas.microsoft.com/office/drawing/2014/main" xmlns="" id="{FBD453A1-A3AF-40EE-837B-2CADAC3A6221}"/>
+                <a16:creationId xmlns="" xmlns:a16="http://schemas.microsoft.com/office/drawing/2014/main" id="{FBD453A1-A3AF-40EE-837B-2CADAC3A6221}"/>
               </a:ext>
             </a:extLst>
           </p:cNvPr>
@@ -12668,7 +12852,7 @@
           <p:cNvPr id="51" name="Rectangle 50">
             <a:extLst>
               <a:ext uri="{FF2B5EF4-FFF2-40B4-BE49-F238E27FC236}">
-                <a16:creationId xmlns:a16="http://schemas.microsoft.com/office/drawing/2014/main" xmlns="" id="{6B8F8C16-8BF5-44CE-A165-28895472E11E}"/>
+                <a16:creationId xmlns="" xmlns:a16="http://schemas.microsoft.com/office/drawing/2014/main" id="{6B8F8C16-8BF5-44CE-A165-28895472E11E}"/>
               </a:ext>
             </a:extLst>
           </p:cNvPr>
@@ -12727,7 +12911,7 @@
           <p:cNvPr id="52" name="Rectangle 51">
             <a:extLst>
               <a:ext uri="{FF2B5EF4-FFF2-40B4-BE49-F238E27FC236}">
-                <a16:creationId xmlns:a16="http://schemas.microsoft.com/office/drawing/2014/main" xmlns="" id="{FBD453A1-A3AF-40EE-837B-2CADAC3A6221}"/>
+                <a16:creationId xmlns="" xmlns:a16="http://schemas.microsoft.com/office/drawing/2014/main" id="{FBD453A1-A3AF-40EE-837B-2CADAC3A6221}"/>
               </a:ext>
             </a:extLst>
           </p:cNvPr>
@@ -12925,7 +13109,7 @@
           <p:cNvPr id="53" name="Rectangle 52">
             <a:extLst>
               <a:ext uri="{FF2B5EF4-FFF2-40B4-BE49-F238E27FC236}">
-                <a16:creationId xmlns:a16="http://schemas.microsoft.com/office/drawing/2014/main" xmlns="" id="{6B8F8C16-8BF5-44CE-A165-28895472E11E}"/>
+                <a16:creationId xmlns="" xmlns:a16="http://schemas.microsoft.com/office/drawing/2014/main" id="{6B8F8C16-8BF5-44CE-A165-28895472E11E}"/>
               </a:ext>
             </a:extLst>
           </p:cNvPr>
@@ -12984,7 +13168,7 @@
           <p:cNvPr id="54" name="Rectangle 53">
             <a:extLst>
               <a:ext uri="{FF2B5EF4-FFF2-40B4-BE49-F238E27FC236}">
-                <a16:creationId xmlns:a16="http://schemas.microsoft.com/office/drawing/2014/main" xmlns="" id="{6B8F8C16-8BF5-44CE-A165-28895472E11E}"/>
+                <a16:creationId xmlns="" xmlns:a16="http://schemas.microsoft.com/office/drawing/2014/main" id="{6B8F8C16-8BF5-44CE-A165-28895472E11E}"/>
               </a:ext>
             </a:extLst>
           </p:cNvPr>
@@ -13043,7 +13227,7 @@
           <p:cNvPr id="55" name="Rectangle 54">
             <a:extLst>
               <a:ext uri="{FF2B5EF4-FFF2-40B4-BE49-F238E27FC236}">
-                <a16:creationId xmlns:a16="http://schemas.microsoft.com/office/drawing/2014/main" xmlns="" id="{FBD453A1-A3AF-40EE-837B-2CADAC3A6221}"/>
+                <a16:creationId xmlns="" xmlns:a16="http://schemas.microsoft.com/office/drawing/2014/main" id="{FBD453A1-A3AF-40EE-837B-2CADAC3A6221}"/>
               </a:ext>
             </a:extLst>
           </p:cNvPr>
@@ -13183,7 +13367,7 @@
           <p:cNvPr id="56" name="Rectangle 55">
             <a:extLst>
               <a:ext uri="{FF2B5EF4-FFF2-40B4-BE49-F238E27FC236}">
-                <a16:creationId xmlns:a16="http://schemas.microsoft.com/office/drawing/2014/main" xmlns="" id="{FBD453A1-A3AF-40EE-837B-2CADAC3A6221}"/>
+                <a16:creationId xmlns="" xmlns:a16="http://schemas.microsoft.com/office/drawing/2014/main" id="{FBD453A1-A3AF-40EE-837B-2CADAC3A6221}"/>
               </a:ext>
             </a:extLst>
           </p:cNvPr>
@@ -13317,7 +13501,7 @@
           <p:cNvPr id="57" name="Rectangle 56">
             <a:extLst>
               <a:ext uri="{FF2B5EF4-FFF2-40B4-BE49-F238E27FC236}">
-                <a16:creationId xmlns:a16="http://schemas.microsoft.com/office/drawing/2014/main" xmlns="" id="{FBD453A1-A3AF-40EE-837B-2CADAC3A6221}"/>
+                <a16:creationId xmlns="" xmlns:a16="http://schemas.microsoft.com/office/drawing/2014/main" id="{FBD453A1-A3AF-40EE-837B-2CADAC3A6221}"/>
               </a:ext>
             </a:extLst>
           </p:cNvPr>
@@ -13403,11 +13587,6 @@
               </a:rPr>
               <a:t> file for pre-processing - mask of pixels of interest - path to the folder where all results will be saved</a:t>
             </a:r>
-            <a:endParaRPr lang="en-GB" sz="700" dirty="0" smtClean="0">
-              <a:solidFill>
-                <a:schemeClr val="bg1"/>
-              </a:solidFill>
-            </a:endParaRPr>
           </a:p>
         </p:txBody>
       </p:sp>
@@ -13416,7 +13595,7 @@
           <p:cNvPr id="58" name="Rectangle 57">
             <a:extLst>
               <a:ext uri="{FF2B5EF4-FFF2-40B4-BE49-F238E27FC236}">
-                <a16:creationId xmlns:a16="http://schemas.microsoft.com/office/drawing/2014/main" xmlns="" id="{FBD453A1-A3AF-40EE-837B-2CADAC3A6221}"/>
+                <a16:creationId xmlns="" xmlns:a16="http://schemas.microsoft.com/office/drawing/2014/main" id="{FBD453A1-A3AF-40EE-837B-2CADAC3A6221}"/>
               </a:ext>
             </a:extLst>
           </p:cNvPr>
@@ -13470,11 +13649,6 @@
               </a:rPr>
               <a:t>total spectral and related m/z values – pixels number for the given mask - height and width of the image</a:t>
             </a:r>
-            <a:endParaRPr lang="en-GB" sz="700" dirty="0" smtClean="0">
-              <a:solidFill>
-                <a:schemeClr val="bg1"/>
-              </a:solidFill>
-            </a:endParaRPr>
           </a:p>
         </p:txBody>
       </p:sp>
@@ -13483,7 +13657,7 @@
           <p:cNvPr id="59" name="Rectangle 58">
             <a:extLst>
               <a:ext uri="{FF2B5EF4-FFF2-40B4-BE49-F238E27FC236}">
-                <a16:creationId xmlns:a16="http://schemas.microsoft.com/office/drawing/2014/main" xmlns="" id="{FBD453A1-A3AF-40EE-837B-2CADAC3A6221}"/>
+                <a16:creationId xmlns="" xmlns:a16="http://schemas.microsoft.com/office/drawing/2014/main" id="{FBD453A1-A3AF-40EE-837B-2CADAC3A6221}"/>
               </a:ext>
             </a:extLst>
           </p:cNvPr>
@@ -13630,7 +13804,7 @@
           <p:cNvPr id="60" name="Rectangle 59">
             <a:extLst>
               <a:ext uri="{FF2B5EF4-FFF2-40B4-BE49-F238E27FC236}">
-                <a16:creationId xmlns:a16="http://schemas.microsoft.com/office/drawing/2014/main" xmlns="" id="{FBD453A1-A3AF-40EE-837B-2CADAC3A6221}"/>
+                <a16:creationId xmlns="" xmlns:a16="http://schemas.microsoft.com/office/drawing/2014/main" id="{FBD453A1-A3AF-40EE-837B-2CADAC3A6221}"/>
               </a:ext>
             </a:extLst>
           </p:cNvPr>
@@ -13708,11 +13882,6 @@
               </a:rPr>
               <a:t> are saved for all files</a:t>
             </a:r>
-            <a:endParaRPr lang="en-GB" sz="700" dirty="0" smtClean="0">
-              <a:solidFill>
-                <a:schemeClr val="bg1"/>
-              </a:solidFill>
-            </a:endParaRPr>
           </a:p>
         </p:txBody>
       </p:sp>
@@ -13721,7 +13890,7 @@
           <p:cNvPr id="61" name="Rectangle 60">
             <a:extLst>
               <a:ext uri="{FF2B5EF4-FFF2-40B4-BE49-F238E27FC236}">
-                <a16:creationId xmlns:a16="http://schemas.microsoft.com/office/drawing/2014/main" xmlns="" id="{FBD453A1-A3AF-40EE-837B-2CADAC3A6221}"/>
+                <a16:creationId xmlns="" xmlns:a16="http://schemas.microsoft.com/office/drawing/2014/main" id="{FBD453A1-A3AF-40EE-837B-2CADAC3A6221}"/>
               </a:ext>
             </a:extLst>
           </p:cNvPr>
@@ -13852,7 +14021,7 @@
           <p:cNvPr id="62" name="Rectangle 61">
             <a:extLst>
               <a:ext uri="{FF2B5EF4-FFF2-40B4-BE49-F238E27FC236}">
-                <a16:creationId xmlns:a16="http://schemas.microsoft.com/office/drawing/2014/main" xmlns="" id="{FBD453A1-A3AF-40EE-837B-2CADAC3A6221}"/>
+                <a16:creationId xmlns="" xmlns:a16="http://schemas.microsoft.com/office/drawing/2014/main" id="{FBD453A1-A3AF-40EE-837B-2CADAC3A6221}"/>
               </a:ext>
             </a:extLst>
           </p:cNvPr>
@@ -13999,7 +14168,7 @@
           <p:cNvPr id="63" name="Rectangle 62">
             <a:extLst>
               <a:ext uri="{FF2B5EF4-FFF2-40B4-BE49-F238E27FC236}">
-                <a16:creationId xmlns:a16="http://schemas.microsoft.com/office/drawing/2014/main" xmlns="" id="{FBD453A1-A3AF-40EE-837B-2CADAC3A6221}"/>
+                <a16:creationId xmlns="" xmlns:a16="http://schemas.microsoft.com/office/drawing/2014/main" id="{FBD453A1-A3AF-40EE-837B-2CADAC3A6221}"/>
               </a:ext>
             </a:extLst>
           </p:cNvPr>
@@ -14098,7 +14267,7 @@
           <p:cNvPr id="64" name="Rectangle 63">
             <a:extLst>
               <a:ext uri="{FF2B5EF4-FFF2-40B4-BE49-F238E27FC236}">
-                <a16:creationId xmlns:a16="http://schemas.microsoft.com/office/drawing/2014/main" xmlns="" id="{FBD453A1-A3AF-40EE-837B-2CADAC3A6221}"/>
+                <a16:creationId xmlns="" xmlns:a16="http://schemas.microsoft.com/office/drawing/2014/main" id="{FBD453A1-A3AF-40EE-837B-2CADAC3A6221}"/>
               </a:ext>
             </a:extLst>
           </p:cNvPr>
@@ -14184,7 +14353,7 @@
           <p:cNvPr id="65" name="Rectangle 64">
             <a:extLst>
               <a:ext uri="{FF2B5EF4-FFF2-40B4-BE49-F238E27FC236}">
-                <a16:creationId xmlns:a16="http://schemas.microsoft.com/office/drawing/2014/main" xmlns="" id="{FBD453A1-A3AF-40EE-837B-2CADAC3A6221}"/>
+                <a16:creationId xmlns="" xmlns:a16="http://schemas.microsoft.com/office/drawing/2014/main" id="{FBD453A1-A3AF-40EE-837B-2CADAC3A6221}"/>
               </a:ext>
             </a:extLst>
           </p:cNvPr>
@@ -14238,11 +14407,6 @@
               </a:rPr>
               <a:t>the vector with all m/z values that belong to anything requested in the inputs file – the same exact vector is saved for all files</a:t>
             </a:r>
-            <a:endParaRPr lang="en-GB" sz="700" dirty="0" smtClean="0">
-              <a:solidFill>
-                <a:schemeClr val="bg1"/>
-              </a:solidFill>
-            </a:endParaRPr>
           </a:p>
         </p:txBody>
       </p:sp>
@@ -14251,7 +14415,7 @@
           <p:cNvPr id="66" name="Rectangle 65">
             <a:extLst>
               <a:ext uri="{FF2B5EF4-FFF2-40B4-BE49-F238E27FC236}">
-                <a16:creationId xmlns:a16="http://schemas.microsoft.com/office/drawing/2014/main" xmlns="" id="{6B8F8C16-8BF5-44CE-A165-28895472E11E}"/>
+                <a16:creationId xmlns="" xmlns:a16="http://schemas.microsoft.com/office/drawing/2014/main" id="{6B8F8C16-8BF5-44CE-A165-28895472E11E}"/>
               </a:ext>
             </a:extLst>
           </p:cNvPr>
@@ -14308,7 +14472,7 @@
           <p:cNvPr id="67" name="Rectangle 66">
             <a:extLst>
               <a:ext uri="{FF2B5EF4-FFF2-40B4-BE49-F238E27FC236}">
-                <a16:creationId xmlns:a16="http://schemas.microsoft.com/office/drawing/2014/main" xmlns="" id="{6B8F8C16-8BF5-44CE-A165-28895472E11E}"/>
+                <a16:creationId xmlns="" xmlns:a16="http://schemas.microsoft.com/office/drawing/2014/main" id="{6B8F8C16-8BF5-44CE-A165-28895472E11E}"/>
               </a:ext>
             </a:extLst>
           </p:cNvPr>
@@ -14365,7 +14529,7 @@
           <p:cNvPr id="68" name="Rectangle 67">
             <a:extLst>
               <a:ext uri="{FF2B5EF4-FFF2-40B4-BE49-F238E27FC236}">
-                <a16:creationId xmlns:a16="http://schemas.microsoft.com/office/drawing/2014/main" xmlns="" id="{6B8F8C16-8BF5-44CE-A165-28895472E11E}"/>
+                <a16:creationId xmlns="" xmlns:a16="http://schemas.microsoft.com/office/drawing/2014/main" id="{6B8F8C16-8BF5-44CE-A165-28895472E11E}"/>
               </a:ext>
             </a:extLst>
           </p:cNvPr>
@@ -14422,7 +14586,7 @@
           <p:cNvPr id="69" name="Rectangle 68">
             <a:extLst>
               <a:ext uri="{FF2B5EF4-FFF2-40B4-BE49-F238E27FC236}">
-                <a16:creationId xmlns:a16="http://schemas.microsoft.com/office/drawing/2014/main" xmlns="" id="{6B8F8C16-8BF5-44CE-A165-28895472E11E}"/>
+                <a16:creationId xmlns="" xmlns:a16="http://schemas.microsoft.com/office/drawing/2014/main" id="{6B8F8C16-8BF5-44CE-A165-28895472E11E}"/>
               </a:ext>
             </a:extLst>
           </p:cNvPr>
@@ -14479,7 +14643,7 @@
           <p:cNvPr id="70" name="Rectangle 69">
             <a:extLst>
               <a:ext uri="{FF2B5EF4-FFF2-40B4-BE49-F238E27FC236}">
-                <a16:creationId xmlns:a16="http://schemas.microsoft.com/office/drawing/2014/main" xmlns="" id="{6B8F8C16-8BF5-44CE-A165-28895472E11E}"/>
+                <a16:creationId xmlns="" xmlns:a16="http://schemas.microsoft.com/office/drawing/2014/main" id="{6B8F8C16-8BF5-44CE-A165-28895472E11E}"/>
               </a:ext>
             </a:extLst>
           </p:cNvPr>
@@ -14536,7 +14700,7 @@
           <p:cNvPr id="71" name="Rectangle 70">
             <a:extLst>
               <a:ext uri="{FF2B5EF4-FFF2-40B4-BE49-F238E27FC236}">
-                <a16:creationId xmlns:a16="http://schemas.microsoft.com/office/drawing/2014/main" xmlns="" id="{FBD453A1-A3AF-40EE-837B-2CADAC3A6221}"/>
+                <a16:creationId xmlns="" xmlns:a16="http://schemas.microsoft.com/office/drawing/2014/main" id="{FBD453A1-A3AF-40EE-837B-2CADAC3A6221}"/>
               </a:ext>
             </a:extLst>
           </p:cNvPr>
@@ -14603,7 +14767,7 @@
           <p:cNvPr id="72" name="Rectangle 71">
             <a:extLst>
               <a:ext uri="{FF2B5EF4-FFF2-40B4-BE49-F238E27FC236}">
-                <a16:creationId xmlns:a16="http://schemas.microsoft.com/office/drawing/2014/main" xmlns="" id="{6B8F8C16-8BF5-44CE-A165-28895472E11E}"/>
+                <a16:creationId xmlns="" xmlns:a16="http://schemas.microsoft.com/office/drawing/2014/main" id="{6B8F8C16-8BF5-44CE-A165-28895472E11E}"/>
               </a:ext>
             </a:extLst>
           </p:cNvPr>
@@ -14710,7 +14874,7 @@
           <p:cNvPr id="129" name="Straight Arrow Connector 128">
             <a:extLst>
               <a:ext uri="{FF2B5EF4-FFF2-40B4-BE49-F238E27FC236}">
-                <a16:creationId xmlns:a16="http://schemas.microsoft.com/office/drawing/2014/main" xmlns="" id="{4FE9E570-253C-4922-BA49-B370F36F4CAA}"/>
+                <a16:creationId xmlns="" xmlns:a16="http://schemas.microsoft.com/office/drawing/2014/main" id="{4FE9E570-253C-4922-BA49-B370F36F4CAA}"/>
               </a:ext>
             </a:extLst>
           </p:cNvPr>
@@ -14755,7 +14919,7 @@
           <p:cNvPr id="176" name="Rectangle 175">
             <a:extLst>
               <a:ext uri="{FF2B5EF4-FFF2-40B4-BE49-F238E27FC236}">
-                <a16:creationId xmlns:a16="http://schemas.microsoft.com/office/drawing/2014/main" xmlns="" id="{FBD453A1-A3AF-40EE-837B-2CADAC3A6221}"/>
+                <a16:creationId xmlns="" xmlns:a16="http://schemas.microsoft.com/office/drawing/2014/main" id="{FBD453A1-A3AF-40EE-837B-2CADAC3A6221}"/>
               </a:ext>
             </a:extLst>
           </p:cNvPr>
@@ -14935,7 +15099,7 @@
           <p:cNvPr id="42" name="Rectangle 41">
             <a:extLst>
               <a:ext uri="{FF2B5EF4-FFF2-40B4-BE49-F238E27FC236}">
-                <a16:creationId xmlns:a16="http://schemas.microsoft.com/office/drawing/2014/main" xmlns="" id="{6B8F8C16-8BF5-44CE-A165-28895472E11E}"/>
+                <a16:creationId xmlns="" xmlns:a16="http://schemas.microsoft.com/office/drawing/2014/main" id="{6B8F8C16-8BF5-44CE-A165-28895472E11E}"/>
               </a:ext>
             </a:extLst>
           </p:cNvPr>
@@ -14989,7 +15153,7 @@
           <p:cNvPr id="43" name="Rectangle 42">
             <a:extLst>
               <a:ext uri="{FF2B5EF4-FFF2-40B4-BE49-F238E27FC236}">
-                <a16:creationId xmlns:a16="http://schemas.microsoft.com/office/drawing/2014/main" xmlns="" id="{6B8F8C16-8BF5-44CE-A165-28895472E11E}"/>
+                <a16:creationId xmlns="" xmlns:a16="http://schemas.microsoft.com/office/drawing/2014/main" id="{6B8F8C16-8BF5-44CE-A165-28895472E11E}"/>
               </a:ext>
             </a:extLst>
           </p:cNvPr>
@@ -15044,7 +15208,7 @@
           <p:cNvPr id="44" name="Rectangle 43">
             <a:extLst>
               <a:ext uri="{FF2B5EF4-FFF2-40B4-BE49-F238E27FC236}">
-                <a16:creationId xmlns:a16="http://schemas.microsoft.com/office/drawing/2014/main" xmlns="" id="{FBD453A1-A3AF-40EE-837B-2CADAC3A6221}"/>
+                <a16:creationId xmlns="" xmlns:a16="http://schemas.microsoft.com/office/drawing/2014/main" id="{FBD453A1-A3AF-40EE-837B-2CADAC3A6221}"/>
               </a:ext>
             </a:extLst>
           </p:cNvPr>
@@ -15294,7 +15458,7 @@
           <p:cNvPr id="45" name="Rectangle 44">
             <a:extLst>
               <a:ext uri="{FF2B5EF4-FFF2-40B4-BE49-F238E27FC236}">
-                <a16:creationId xmlns:a16="http://schemas.microsoft.com/office/drawing/2014/main" xmlns="" id="{FBD453A1-A3AF-40EE-837B-2CADAC3A6221}"/>
+                <a16:creationId xmlns="" xmlns:a16="http://schemas.microsoft.com/office/drawing/2014/main" id="{FBD453A1-A3AF-40EE-837B-2CADAC3A6221}"/>
               </a:ext>
             </a:extLst>
           </p:cNvPr>
@@ -15528,14 +15692,6 @@
               </a:rPr>
               <a:t>)</a:t>
             </a:r>
-            <a:endParaRPr lang="en-GB" sz="700" dirty="0">
-              <a:solidFill>
-                <a:schemeClr val="accent3">
-                  <a:lumMod val="50000"/>
-                </a:schemeClr>
-              </a:solidFill>
-              <a:latin typeface="Ubuntu Mono" panose="020B0509030602030204" pitchFamily="49" charset="0"/>
-            </a:endParaRPr>
           </a:p>
         </p:txBody>
       </p:sp>
@@ -15544,7 +15700,7 @@
           <p:cNvPr id="72" name="Rectangle 71">
             <a:extLst>
               <a:ext uri="{FF2B5EF4-FFF2-40B4-BE49-F238E27FC236}">
-                <a16:creationId xmlns:a16="http://schemas.microsoft.com/office/drawing/2014/main" xmlns="" id="{FBD453A1-A3AF-40EE-837B-2CADAC3A6221}"/>
+                <a16:creationId xmlns="" xmlns:a16="http://schemas.microsoft.com/office/drawing/2014/main" id="{FBD453A1-A3AF-40EE-837B-2CADAC3A6221}"/>
               </a:ext>
             </a:extLst>
           </p:cNvPr>
@@ -15683,7 +15839,7 @@
           <p:cNvPr id="73" name="Rectangle 72">
             <a:extLst>
               <a:ext uri="{FF2B5EF4-FFF2-40B4-BE49-F238E27FC236}">
-                <a16:creationId xmlns:a16="http://schemas.microsoft.com/office/drawing/2014/main" xmlns="" id="{FBD453A1-A3AF-40EE-837B-2CADAC3A6221}"/>
+                <a16:creationId xmlns="" xmlns:a16="http://schemas.microsoft.com/office/drawing/2014/main" id="{FBD453A1-A3AF-40EE-837B-2CADAC3A6221}"/>
               </a:ext>
             </a:extLst>
           </p:cNvPr>
@@ -15822,7 +15978,7 @@
           <p:cNvPr id="74" name="Rectangle 73">
             <a:extLst>
               <a:ext uri="{FF2B5EF4-FFF2-40B4-BE49-F238E27FC236}">
-                <a16:creationId xmlns:a16="http://schemas.microsoft.com/office/drawing/2014/main" xmlns="" id="{FBD453A1-A3AF-40EE-837B-2CADAC3A6221}"/>
+                <a16:creationId xmlns="" xmlns:a16="http://schemas.microsoft.com/office/drawing/2014/main" id="{FBD453A1-A3AF-40EE-837B-2CADAC3A6221}"/>
               </a:ext>
             </a:extLst>
           </p:cNvPr>
@@ -15892,11 +16048,6 @@
               </a:rPr>
               <a:t> files that are necessary to plot the results are saved</a:t>
             </a:r>
-            <a:endParaRPr lang="en-GB" sz="700" dirty="0" smtClean="0">
-              <a:solidFill>
-                <a:schemeClr val="bg1"/>
-              </a:solidFill>
-            </a:endParaRPr>
           </a:p>
         </p:txBody>
       </p:sp>
@@ -15905,7 +16056,7 @@
           <p:cNvPr id="75" name="Rectangle 74">
             <a:extLst>
               <a:ext uri="{FF2B5EF4-FFF2-40B4-BE49-F238E27FC236}">
-                <a16:creationId xmlns:a16="http://schemas.microsoft.com/office/drawing/2014/main" xmlns="" id="{6B8F8C16-8BF5-44CE-A165-28895472E11E}"/>
+                <a16:creationId xmlns="" xmlns:a16="http://schemas.microsoft.com/office/drawing/2014/main" id="{6B8F8C16-8BF5-44CE-A165-28895472E11E}"/>
               </a:ext>
             </a:extLst>
           </p:cNvPr>
@@ -15962,7 +16113,7 @@
           <p:cNvPr id="76" name="Rectangle 75">
             <a:extLst>
               <a:ext uri="{FF2B5EF4-FFF2-40B4-BE49-F238E27FC236}">
-                <a16:creationId xmlns:a16="http://schemas.microsoft.com/office/drawing/2014/main" xmlns="" id="{6B8F8C16-8BF5-44CE-A165-28895472E11E}"/>
+                <a16:creationId xmlns="" xmlns:a16="http://schemas.microsoft.com/office/drawing/2014/main" id="{6B8F8C16-8BF5-44CE-A165-28895472E11E}"/>
               </a:ext>
             </a:extLst>
           </p:cNvPr>
@@ -16019,7 +16170,7 @@
           <p:cNvPr id="77" name="Rectangle 76">
             <a:extLst>
               <a:ext uri="{FF2B5EF4-FFF2-40B4-BE49-F238E27FC236}">
-                <a16:creationId xmlns:a16="http://schemas.microsoft.com/office/drawing/2014/main" xmlns="" id="{FBD453A1-A3AF-40EE-837B-2CADAC3A6221}"/>
+                <a16:creationId xmlns="" xmlns:a16="http://schemas.microsoft.com/office/drawing/2014/main" id="{FBD453A1-A3AF-40EE-837B-2CADAC3A6221}"/>
               </a:ext>
             </a:extLst>
           </p:cNvPr>
@@ -16089,11 +16240,6 @@
               </a:rPr>
               <a:t> for the 10 top loadings are saved – tables with the peaks that belong to each component are saved</a:t>
             </a:r>
-            <a:endParaRPr lang="en-GB" sz="700" dirty="0" smtClean="0">
-              <a:solidFill>
-                <a:schemeClr val="bg1"/>
-              </a:solidFill>
-            </a:endParaRPr>
           </a:p>
         </p:txBody>
       </p:sp>
@@ -16102,7 +16248,7 @@
           <p:cNvPr id="78" name="Rectangle 77">
             <a:extLst>
               <a:ext uri="{FF2B5EF4-FFF2-40B4-BE49-F238E27FC236}">
-                <a16:creationId xmlns:a16="http://schemas.microsoft.com/office/drawing/2014/main" xmlns="" id="{6B8F8C16-8BF5-44CE-A165-28895472E11E}"/>
+                <a16:creationId xmlns="" xmlns:a16="http://schemas.microsoft.com/office/drawing/2014/main" id="{6B8F8C16-8BF5-44CE-A165-28895472E11E}"/>
               </a:ext>
             </a:extLst>
           </p:cNvPr>
@@ -16157,7 +16303,7 @@
           <p:cNvPr id="79" name="Rectangle 78">
             <a:extLst>
               <a:ext uri="{FF2B5EF4-FFF2-40B4-BE49-F238E27FC236}">
-                <a16:creationId xmlns:a16="http://schemas.microsoft.com/office/drawing/2014/main" xmlns="" id="{FBD453A1-A3AF-40EE-837B-2CADAC3A6221}"/>
+                <a16:creationId xmlns="" xmlns:a16="http://schemas.microsoft.com/office/drawing/2014/main" id="{FBD453A1-A3AF-40EE-837B-2CADAC3A6221}"/>
               </a:ext>
             </a:extLst>
           </p:cNvPr>
@@ -16637,7 +16783,7 @@
           <p:cNvPr id="80" name="Rectangle 79">
             <a:extLst>
               <a:ext uri="{FF2B5EF4-FFF2-40B4-BE49-F238E27FC236}">
-                <a16:creationId xmlns:a16="http://schemas.microsoft.com/office/drawing/2014/main" xmlns="" id="{FBD453A1-A3AF-40EE-837B-2CADAC3A6221}"/>
+                <a16:creationId xmlns="" xmlns:a16="http://schemas.microsoft.com/office/drawing/2014/main" id="{FBD453A1-A3AF-40EE-837B-2CADAC3A6221}"/>
               </a:ext>
             </a:extLst>
           </p:cNvPr>
@@ -16801,7 +16947,7 @@
           <p:cNvPr id="81" name="Rectangle 80">
             <a:extLst>
               <a:ext uri="{FF2B5EF4-FFF2-40B4-BE49-F238E27FC236}">
-                <a16:creationId xmlns:a16="http://schemas.microsoft.com/office/drawing/2014/main" xmlns="" id="{6B8F8C16-8BF5-44CE-A165-28895472E11E}"/>
+                <a16:creationId xmlns="" xmlns:a16="http://schemas.microsoft.com/office/drawing/2014/main" id="{6B8F8C16-8BF5-44CE-A165-28895472E11E}"/>
               </a:ext>
             </a:extLst>
           </p:cNvPr>
@@ -16858,7 +17004,7 @@
           <p:cNvPr id="82" name="Rectangle 81">
             <a:extLst>
               <a:ext uri="{FF2B5EF4-FFF2-40B4-BE49-F238E27FC236}">
-                <a16:creationId xmlns:a16="http://schemas.microsoft.com/office/drawing/2014/main" xmlns="" id="{FBD453A1-A3AF-40EE-837B-2CADAC3A6221}"/>
+                <a16:creationId xmlns="" xmlns:a16="http://schemas.microsoft.com/office/drawing/2014/main" id="{FBD453A1-A3AF-40EE-837B-2CADAC3A6221}"/>
               </a:ext>
             </a:extLst>
           </p:cNvPr>
@@ -16928,11 +17074,6 @@
               </a:rPr>
               <a:t> using the small mask are also saved</a:t>
             </a:r>
-            <a:endParaRPr lang="en-GB" sz="700" dirty="0" smtClean="0">
-              <a:solidFill>
-                <a:schemeClr val="bg1"/>
-              </a:solidFill>
-            </a:endParaRPr>
           </a:p>
         </p:txBody>
       </p:sp>
@@ -16941,7 +17082,7 @@
           <p:cNvPr id="83" name="Rectangle 82">
             <a:extLst>
               <a:ext uri="{FF2B5EF4-FFF2-40B4-BE49-F238E27FC236}">
-                <a16:creationId xmlns:a16="http://schemas.microsoft.com/office/drawing/2014/main" xmlns="" id="{6B8F8C16-8BF5-44CE-A165-28895472E11E}"/>
+                <a16:creationId xmlns="" xmlns:a16="http://schemas.microsoft.com/office/drawing/2014/main" id="{6B8F8C16-8BF5-44CE-A165-28895472E11E}"/>
               </a:ext>
             </a:extLst>
           </p:cNvPr>
@@ -17007,7 +17148,7 @@
           <p:cNvPr id="84" name="Rectangle 83">
             <a:extLst>
               <a:ext uri="{FF2B5EF4-FFF2-40B4-BE49-F238E27FC236}">
-                <a16:creationId xmlns:a16="http://schemas.microsoft.com/office/drawing/2014/main" xmlns="" id="{FBD453A1-A3AF-40EE-837B-2CADAC3A6221}"/>
+                <a16:creationId xmlns="" xmlns:a16="http://schemas.microsoft.com/office/drawing/2014/main" id="{FBD453A1-A3AF-40EE-837B-2CADAC3A6221}"/>
               </a:ext>
             </a:extLst>
           </p:cNvPr>
@@ -17241,14 +17382,6 @@
               </a:rPr>
               <a:t> );</a:t>
             </a:r>
-            <a:endParaRPr lang="en-GB" sz="700" dirty="0">
-              <a:solidFill>
-                <a:schemeClr val="accent3">
-                  <a:lumMod val="50000"/>
-                </a:schemeClr>
-              </a:solidFill>
-              <a:latin typeface="Ubuntu Mono" panose="020B0509030602030204" pitchFamily="49" charset="0"/>
-            </a:endParaRPr>
           </a:p>
         </p:txBody>
       </p:sp>
@@ -17257,7 +17390,7 @@
           <p:cNvPr id="85" name="Rectangle 84">
             <a:extLst>
               <a:ext uri="{FF2B5EF4-FFF2-40B4-BE49-F238E27FC236}">
-                <a16:creationId xmlns:a16="http://schemas.microsoft.com/office/drawing/2014/main" xmlns="" id="{FBD453A1-A3AF-40EE-837B-2CADAC3A6221}"/>
+                <a16:creationId xmlns="" xmlns:a16="http://schemas.microsoft.com/office/drawing/2014/main" id="{FBD453A1-A3AF-40EE-837B-2CADAC3A6221}"/>
               </a:ext>
             </a:extLst>
           </p:cNvPr>
@@ -17436,7 +17569,7 @@
           <p:cNvPr id="86" name="Rectangle 85">
             <a:extLst>
               <a:ext uri="{FF2B5EF4-FFF2-40B4-BE49-F238E27FC236}">
-                <a16:creationId xmlns:a16="http://schemas.microsoft.com/office/drawing/2014/main" xmlns="" id="{6B8F8C16-8BF5-44CE-A165-28895472E11E}"/>
+                <a16:creationId xmlns="" xmlns:a16="http://schemas.microsoft.com/office/drawing/2014/main" id="{6B8F8C16-8BF5-44CE-A165-28895472E11E}"/>
               </a:ext>
             </a:extLst>
           </p:cNvPr>
@@ -17493,7 +17626,7 @@
           <p:cNvPr id="87" name="Rectangle 86">
             <a:extLst>
               <a:ext uri="{FF2B5EF4-FFF2-40B4-BE49-F238E27FC236}">
-                <a16:creationId xmlns:a16="http://schemas.microsoft.com/office/drawing/2014/main" xmlns="" id="{FBD453A1-A3AF-40EE-837B-2CADAC3A6221}"/>
+                <a16:creationId xmlns="" xmlns:a16="http://schemas.microsoft.com/office/drawing/2014/main" id="{FBD453A1-A3AF-40EE-837B-2CADAC3A6221}"/>
               </a:ext>
             </a:extLst>
           </p:cNvPr>
@@ -17547,11 +17680,6 @@
               </a:rPr>
               <a:t>a lists of files paths – a list of main masks – a list of small masks – the position occupied by each small mask</a:t>
             </a:r>
-            <a:endParaRPr lang="en-GB" sz="700" dirty="0" smtClean="0">
-              <a:solidFill>
-                <a:schemeClr val="bg1"/>
-              </a:solidFill>
-            </a:endParaRPr>
           </a:p>
         </p:txBody>
       </p:sp>
@@ -17560,7 +17688,7 @@
           <p:cNvPr id="88" name="Rectangle 87">
             <a:extLst>
               <a:ext uri="{FF2B5EF4-FFF2-40B4-BE49-F238E27FC236}">
-                <a16:creationId xmlns:a16="http://schemas.microsoft.com/office/drawing/2014/main" xmlns="" id="{6B8F8C16-8BF5-44CE-A165-28895472E11E}"/>
+                <a16:creationId xmlns="" xmlns:a16="http://schemas.microsoft.com/office/drawing/2014/main" id="{6B8F8C16-8BF5-44CE-A165-28895472E11E}"/>
               </a:ext>
             </a:extLst>
           </p:cNvPr>
@@ -17645,7 +17773,7 @@
           <p:cNvPr id="89" name="Rectangle 88">
             <a:extLst>
               <a:ext uri="{FF2B5EF4-FFF2-40B4-BE49-F238E27FC236}">
-                <a16:creationId xmlns:a16="http://schemas.microsoft.com/office/drawing/2014/main" xmlns="" id="{6B8F8C16-8BF5-44CE-A165-28895472E11E}"/>
+                <a16:creationId xmlns="" xmlns:a16="http://schemas.microsoft.com/office/drawing/2014/main" id="{6B8F8C16-8BF5-44CE-A165-28895472E11E}"/>
               </a:ext>
             </a:extLst>
           </p:cNvPr>
@@ -17707,7 +17835,7 @@
           <p:cNvPr id="90" name="Rectangle 89">
             <a:extLst>
               <a:ext uri="{FF2B5EF4-FFF2-40B4-BE49-F238E27FC236}">
-                <a16:creationId xmlns:a16="http://schemas.microsoft.com/office/drawing/2014/main" xmlns="" id="{FBD453A1-A3AF-40EE-837B-2CADAC3A6221}"/>
+                <a16:creationId xmlns="" xmlns:a16="http://schemas.microsoft.com/office/drawing/2014/main" id="{FBD453A1-A3AF-40EE-837B-2CADAC3A6221}"/>
               </a:ext>
             </a:extLst>
           </p:cNvPr>
@@ -17949,7 +18077,7 @@
           <p:cNvPr id="91" name="Rectangle 90">
             <a:extLst>
               <a:ext uri="{FF2B5EF4-FFF2-40B4-BE49-F238E27FC236}">
-                <a16:creationId xmlns:a16="http://schemas.microsoft.com/office/drawing/2014/main" xmlns="" id="{FBD453A1-A3AF-40EE-837B-2CADAC3A6221}"/>
+                <a16:creationId xmlns="" xmlns:a16="http://schemas.microsoft.com/office/drawing/2014/main" id="{FBD453A1-A3AF-40EE-837B-2CADAC3A6221}"/>
               </a:ext>
             </a:extLst>
           </p:cNvPr>
@@ -18096,7 +18224,7 @@
           <p:cNvPr id="94" name="Rectangle 93">
             <a:extLst>
               <a:ext uri="{FF2B5EF4-FFF2-40B4-BE49-F238E27FC236}">
-                <a16:creationId xmlns:a16="http://schemas.microsoft.com/office/drawing/2014/main" xmlns="" id="{FBD453A1-A3AF-40EE-837B-2CADAC3A6221}"/>
+                <a16:creationId xmlns="" xmlns:a16="http://schemas.microsoft.com/office/drawing/2014/main" id="{FBD453A1-A3AF-40EE-837B-2CADAC3A6221}"/>
               </a:ext>
             </a:extLst>
           </p:cNvPr>
@@ -18155,7 +18283,7 @@
           <p:cNvPr id="95" name="Rectangle 94">
             <a:extLst>
               <a:ext uri="{FF2B5EF4-FFF2-40B4-BE49-F238E27FC236}">
-                <a16:creationId xmlns:a16="http://schemas.microsoft.com/office/drawing/2014/main" xmlns="" id="{6B8F8C16-8BF5-44CE-A165-28895472E11E}"/>
+                <a16:creationId xmlns="" xmlns:a16="http://schemas.microsoft.com/office/drawing/2014/main" id="{6B8F8C16-8BF5-44CE-A165-28895472E11E}"/>
               </a:ext>
             </a:extLst>
           </p:cNvPr>
@@ -18212,7 +18340,7 @@
           <p:cNvPr id="98" name="Rectangle 97">
             <a:extLst>
               <a:ext uri="{FF2B5EF4-FFF2-40B4-BE49-F238E27FC236}">
-                <a16:creationId xmlns:a16="http://schemas.microsoft.com/office/drawing/2014/main" xmlns="" id="{6B8F8C16-8BF5-44CE-A165-28895472E11E}"/>
+                <a16:creationId xmlns="" xmlns:a16="http://schemas.microsoft.com/office/drawing/2014/main" id="{6B8F8C16-8BF5-44CE-A165-28895472E11E}"/>
               </a:ext>
             </a:extLst>
           </p:cNvPr>
@@ -18281,7 +18409,7 @@
           <p:cNvPr id="99" name="Rectangle 98">
             <a:extLst>
               <a:ext uri="{FF2B5EF4-FFF2-40B4-BE49-F238E27FC236}">
-                <a16:creationId xmlns:a16="http://schemas.microsoft.com/office/drawing/2014/main" xmlns="" id="{6B8F8C16-8BF5-44CE-A165-28895472E11E}"/>
+                <a16:creationId xmlns="" xmlns:a16="http://schemas.microsoft.com/office/drawing/2014/main" id="{6B8F8C16-8BF5-44CE-A165-28895472E11E}"/>
               </a:ext>
             </a:extLst>
           </p:cNvPr>
@@ -18350,7 +18478,7 @@
           <p:cNvPr id="100" name="Rectangle 99">
             <a:extLst>
               <a:ext uri="{FF2B5EF4-FFF2-40B4-BE49-F238E27FC236}">
-                <a16:creationId xmlns:a16="http://schemas.microsoft.com/office/drawing/2014/main" xmlns="" id="{6B8F8C16-8BF5-44CE-A165-28895472E11E}"/>
+                <a16:creationId xmlns="" xmlns:a16="http://schemas.microsoft.com/office/drawing/2014/main" id="{6B8F8C16-8BF5-44CE-A165-28895472E11E}"/>
               </a:ext>
             </a:extLst>
           </p:cNvPr>
@@ -18449,7 +18577,7 @@
           <p:cNvPr id="129" name="Straight Arrow Connector 128">
             <a:extLst>
               <a:ext uri="{FF2B5EF4-FFF2-40B4-BE49-F238E27FC236}">
-                <a16:creationId xmlns:a16="http://schemas.microsoft.com/office/drawing/2014/main" xmlns="" id="{4FE9E570-253C-4922-BA49-B370F36F4CAA}"/>
+                <a16:creationId xmlns="" xmlns:a16="http://schemas.microsoft.com/office/drawing/2014/main" id="{4FE9E570-253C-4922-BA49-B370F36F4CAA}"/>
               </a:ext>
             </a:extLst>
           </p:cNvPr>
@@ -18494,7 +18622,7 @@
           <p:cNvPr id="176" name="Rectangle 175">
             <a:extLst>
               <a:ext uri="{FF2B5EF4-FFF2-40B4-BE49-F238E27FC236}">
-                <a16:creationId xmlns:a16="http://schemas.microsoft.com/office/drawing/2014/main" xmlns="" id="{FBD453A1-A3AF-40EE-837B-2CADAC3A6221}"/>
+                <a16:creationId xmlns="" xmlns:a16="http://schemas.microsoft.com/office/drawing/2014/main" id="{FBD453A1-A3AF-40EE-837B-2CADAC3A6221}"/>
               </a:ext>
             </a:extLst>
           </p:cNvPr>
@@ -18674,7 +18802,7 @@
           <p:cNvPr id="42" name="Rectangle 41">
             <a:extLst>
               <a:ext uri="{FF2B5EF4-FFF2-40B4-BE49-F238E27FC236}">
-                <a16:creationId xmlns:a16="http://schemas.microsoft.com/office/drawing/2014/main" xmlns="" id="{6B8F8C16-8BF5-44CE-A165-28895472E11E}"/>
+                <a16:creationId xmlns="" xmlns:a16="http://schemas.microsoft.com/office/drawing/2014/main" id="{6B8F8C16-8BF5-44CE-A165-28895472E11E}"/>
               </a:ext>
             </a:extLst>
           </p:cNvPr>
@@ -18728,7 +18856,7 @@
           <p:cNvPr id="44" name="Rectangle 43">
             <a:extLst>
               <a:ext uri="{FF2B5EF4-FFF2-40B4-BE49-F238E27FC236}">
-                <a16:creationId xmlns:a16="http://schemas.microsoft.com/office/drawing/2014/main" xmlns="" id="{FBD453A1-A3AF-40EE-837B-2CADAC3A6221}"/>
+                <a16:creationId xmlns="" xmlns:a16="http://schemas.microsoft.com/office/drawing/2014/main" id="{FBD453A1-A3AF-40EE-837B-2CADAC3A6221}"/>
               </a:ext>
             </a:extLst>
           </p:cNvPr>
@@ -18804,7 +18932,7 @@
           <p:cNvPr id="72" name="Rectangle 71">
             <a:extLst>
               <a:ext uri="{FF2B5EF4-FFF2-40B4-BE49-F238E27FC236}">
-                <a16:creationId xmlns:a16="http://schemas.microsoft.com/office/drawing/2014/main" xmlns="" id="{FBD453A1-A3AF-40EE-837B-2CADAC3A6221}"/>
+                <a16:creationId xmlns="" xmlns:a16="http://schemas.microsoft.com/office/drawing/2014/main" id="{FBD453A1-A3AF-40EE-837B-2CADAC3A6221}"/>
               </a:ext>
             </a:extLst>
           </p:cNvPr>
@@ -19122,11 +19250,6 @@
               </a:rPr>
               <a:t>group1_name = "colon not WT";</a:t>
             </a:r>
-            <a:endParaRPr lang="en-GB" sz="700" dirty="0">
-              <a:solidFill>
-                <a:schemeClr val="bg1"/>
-              </a:solidFill>
-            </a:endParaRPr>
           </a:p>
         </p:txBody>
       </p:sp>
@@ -19135,7 +19258,7 @@
           <p:cNvPr id="74" name="Rectangle 73">
             <a:extLst>
               <a:ext uri="{FF2B5EF4-FFF2-40B4-BE49-F238E27FC236}">
-                <a16:creationId xmlns:a16="http://schemas.microsoft.com/office/drawing/2014/main" xmlns="" id="{FBD453A1-A3AF-40EE-837B-2CADAC3A6221}"/>
+                <a16:creationId xmlns="" xmlns:a16="http://schemas.microsoft.com/office/drawing/2014/main" id="{FBD453A1-A3AF-40EE-837B-2CADAC3A6221}"/>
               </a:ext>
             </a:extLst>
           </p:cNvPr>
@@ -19229,11 +19352,6 @@
               </a:rPr>
               <a:t>)</a:t>
             </a:r>
-            <a:endParaRPr lang="en-GB" sz="700" dirty="0" smtClean="0">
-              <a:solidFill>
-                <a:schemeClr val="bg1"/>
-              </a:solidFill>
-            </a:endParaRPr>
           </a:p>
         </p:txBody>
       </p:sp>
@@ -19242,7 +19360,7 @@
           <p:cNvPr id="75" name="Rectangle 74">
             <a:extLst>
               <a:ext uri="{FF2B5EF4-FFF2-40B4-BE49-F238E27FC236}">
-                <a16:creationId xmlns:a16="http://schemas.microsoft.com/office/drawing/2014/main" xmlns="" id="{6B8F8C16-8BF5-44CE-A165-28895472E11E}"/>
+                <a16:creationId xmlns="" xmlns:a16="http://schemas.microsoft.com/office/drawing/2014/main" id="{6B8F8C16-8BF5-44CE-A165-28895472E11E}"/>
               </a:ext>
             </a:extLst>
           </p:cNvPr>
@@ -19299,7 +19417,7 @@
           <p:cNvPr id="83" name="Rectangle 82">
             <a:extLst>
               <a:ext uri="{FF2B5EF4-FFF2-40B4-BE49-F238E27FC236}">
-                <a16:creationId xmlns:a16="http://schemas.microsoft.com/office/drawing/2014/main" xmlns="" id="{6B8F8C16-8BF5-44CE-A165-28895472E11E}"/>
+                <a16:creationId xmlns="" xmlns:a16="http://schemas.microsoft.com/office/drawing/2014/main" id="{6B8F8C16-8BF5-44CE-A165-28895472E11E}"/>
               </a:ext>
             </a:extLst>
           </p:cNvPr>
@@ -19354,7 +19472,7 @@
           <p:cNvPr id="84" name="Rectangle 83">
             <a:extLst>
               <a:ext uri="{FF2B5EF4-FFF2-40B4-BE49-F238E27FC236}">
-                <a16:creationId xmlns:a16="http://schemas.microsoft.com/office/drawing/2014/main" xmlns="" id="{FBD453A1-A3AF-40EE-837B-2CADAC3A6221}"/>
+                <a16:creationId xmlns="" xmlns:a16="http://schemas.microsoft.com/office/drawing/2014/main" id="{FBD453A1-A3AF-40EE-837B-2CADAC3A6221}"/>
               </a:ext>
             </a:extLst>
           </p:cNvPr>
@@ -19590,14 +19708,6 @@
               </a:rPr>
               <a:t> )</a:t>
             </a:r>
-            <a:endParaRPr lang="en-GB" sz="700" dirty="0">
-              <a:solidFill>
-                <a:schemeClr val="accent3">
-                  <a:lumMod val="50000"/>
-                </a:schemeClr>
-              </a:solidFill>
-              <a:latin typeface="Ubuntu Mono" panose="020B0509030602030204" pitchFamily="49" charset="0"/>
-            </a:endParaRPr>
           </a:p>
         </p:txBody>
       </p:sp>
@@ -19606,7 +19716,7 @@
           <p:cNvPr id="85" name="Rectangle 84">
             <a:extLst>
               <a:ext uri="{FF2B5EF4-FFF2-40B4-BE49-F238E27FC236}">
-                <a16:creationId xmlns:a16="http://schemas.microsoft.com/office/drawing/2014/main" xmlns="" id="{FBD453A1-A3AF-40EE-837B-2CADAC3A6221}"/>
+                <a16:creationId xmlns="" xmlns:a16="http://schemas.microsoft.com/office/drawing/2014/main" id="{FBD453A1-A3AF-40EE-837B-2CADAC3A6221}"/>
               </a:ext>
             </a:extLst>
           </p:cNvPr>
@@ -20017,7 +20127,7 @@
           <p:cNvPr id="86" name="Rectangle 85">
             <a:extLst>
               <a:ext uri="{FF2B5EF4-FFF2-40B4-BE49-F238E27FC236}">
-                <a16:creationId xmlns:a16="http://schemas.microsoft.com/office/drawing/2014/main" xmlns="" id="{6B8F8C16-8BF5-44CE-A165-28895472E11E}"/>
+                <a16:creationId xmlns="" xmlns:a16="http://schemas.microsoft.com/office/drawing/2014/main" id="{6B8F8C16-8BF5-44CE-A165-28895472E11E}"/>
               </a:ext>
             </a:extLst>
           </p:cNvPr>
@@ -20074,7 +20184,7 @@
           <p:cNvPr id="87" name="Rectangle 86">
             <a:extLst>
               <a:ext uri="{FF2B5EF4-FFF2-40B4-BE49-F238E27FC236}">
-                <a16:creationId xmlns:a16="http://schemas.microsoft.com/office/drawing/2014/main" xmlns="" id="{FBD453A1-A3AF-40EE-837B-2CADAC3A6221}"/>
+                <a16:creationId xmlns="" xmlns:a16="http://schemas.microsoft.com/office/drawing/2014/main" id="{FBD453A1-A3AF-40EE-837B-2CADAC3A6221}"/>
               </a:ext>
             </a:extLst>
           </p:cNvPr>
@@ -20152,11 +20262,6 @@
               </a:rPr>
               <a:t>(with an additional column that tells you the potential database where that peak came from) – SIIs for all the m/z values show in the table</a:t>
             </a:r>
-            <a:endParaRPr lang="en-GB" sz="700" dirty="0" smtClean="0">
-              <a:solidFill>
-                <a:schemeClr val="bg1"/>
-              </a:solidFill>
-            </a:endParaRPr>
           </a:p>
         </p:txBody>
       </p:sp>
@@ -20165,7 +20270,7 @@
           <p:cNvPr id="88" name="Rectangle 87">
             <a:extLst>
               <a:ext uri="{FF2B5EF4-FFF2-40B4-BE49-F238E27FC236}">
-                <a16:creationId xmlns:a16="http://schemas.microsoft.com/office/drawing/2014/main" xmlns="" id="{6B8F8C16-8BF5-44CE-A165-28895472E11E}"/>
+                <a16:creationId xmlns="" xmlns:a16="http://schemas.microsoft.com/office/drawing/2014/main" id="{6B8F8C16-8BF5-44CE-A165-28895472E11E}"/>
               </a:ext>
             </a:extLst>
           </p:cNvPr>

</xml_diff>